<commit_message>
update spring boot ppt
</commit_message>
<xml_diff>
--- a/Spring_boot_introduce/Spring Boot Introduce.pptx
+++ b/Spring_boot_introduce/Spring Boot Introduce.pptx
@@ -131,10 +131,10 @@
   </p:defaultTextStyle>
   <p:extLst>
     <p:ext uri="{EFAFB233-063F-42B5-8137-9DF3F51BA10A}">
-      <p15:sldGuideLst xmlns="" xmlns:p15="http://schemas.microsoft.com/office/powerpoint/2012/main"/>
+      <p15:sldGuideLst xmlns:p15="http://schemas.microsoft.com/office/powerpoint/2012/main" xmlns=""/>
     </p:ext>
     <p:ext uri="{2D200454-40CA-4A62-9FC3-DE9A4176ACB9}">
-      <p15:notesGuideLst xmlns="" xmlns:p15="http://schemas.microsoft.com/office/powerpoint/2012/main"/>
+      <p15:notesGuideLst xmlns:p15="http://schemas.microsoft.com/office/powerpoint/2012/main" xmlns=""/>
     </p:ext>
   </p:extLst>
 </p:presentation>
@@ -167,7 +167,7 @@
           <p:cNvPr id="2" name="页眉占位符 1">
             <a:extLst>
               <a:ext uri="{FF2B5EF4-FFF2-40B4-BE49-F238E27FC236}">
-                <a16:creationId xmlns="" xmlns:a16="http://schemas.microsoft.com/office/drawing/2014/main" id="{B9A56829-66AA-42AA-918E-5C6DB1AE50A7}"/>
+                <a16:creationId xmlns:a16="http://schemas.microsoft.com/office/drawing/2014/main" xmlns="" id="{B9A56829-66AA-42AA-918E-5C6DB1AE50A7}"/>
               </a:ext>
             </a:extLst>
           </p:cNvPr>
@@ -204,7 +204,7 @@
           <p:cNvPr id="3" name="日期占位符 2">
             <a:extLst>
               <a:ext uri="{FF2B5EF4-FFF2-40B4-BE49-F238E27FC236}">
-                <a16:creationId xmlns="" xmlns:a16="http://schemas.microsoft.com/office/drawing/2014/main" id="{241084A9-BC5C-4420-B17C-51E328D45576}"/>
+                <a16:creationId xmlns:a16="http://schemas.microsoft.com/office/drawing/2014/main" xmlns="" id="{241084A9-BC5C-4420-B17C-51E328D45576}"/>
               </a:ext>
             </a:extLst>
           </p:cNvPr>
@@ -245,7 +245,7 @@
           <p:cNvPr id="4" name="页脚占位符 3">
             <a:extLst>
               <a:ext uri="{FF2B5EF4-FFF2-40B4-BE49-F238E27FC236}">
-                <a16:creationId xmlns="" xmlns:a16="http://schemas.microsoft.com/office/drawing/2014/main" id="{0D6F2124-7B35-4E59-B9E8-DB09EE1408A4}"/>
+                <a16:creationId xmlns:a16="http://schemas.microsoft.com/office/drawing/2014/main" xmlns="" id="{0D6F2124-7B35-4E59-B9E8-DB09EE1408A4}"/>
               </a:ext>
             </a:extLst>
           </p:cNvPr>
@@ -282,7 +282,7 @@
           <p:cNvPr id="5" name="灯片编号占位符 4">
             <a:extLst>
               <a:ext uri="{FF2B5EF4-FFF2-40B4-BE49-F238E27FC236}">
-                <a16:creationId xmlns="" xmlns:a16="http://schemas.microsoft.com/office/drawing/2014/main" id="{F2BF8FFE-D997-4E34-9A01-CD2014B95241}"/>
+                <a16:creationId xmlns:a16="http://schemas.microsoft.com/office/drawing/2014/main" xmlns="" id="{F2BF8FFE-D997-4E34-9A01-CD2014B95241}"/>
               </a:ext>
             </a:extLst>
           </p:cNvPr>
@@ -700,7 +700,7 @@
           <p:cNvPr id="2" name="组合 1">
             <a:extLst>
               <a:ext uri="{FF2B5EF4-FFF2-40B4-BE49-F238E27FC236}">
-                <a16:creationId xmlns="" xmlns:a14="http://schemas.microsoft.com/office/drawing/2010/main" xmlns:p14="http://schemas.microsoft.com/office/powerpoint/2010/main" xmlns:a16="http://schemas.microsoft.com/office/drawing/2014/main" id="{B17E6D21-F120-4919-9EFA-F925BD0C1809}"/>
+                <a16:creationId xmlns:a16="http://schemas.microsoft.com/office/drawing/2014/main" xmlns:p14="http://schemas.microsoft.com/office/powerpoint/2010/main" xmlns:a14="http://schemas.microsoft.com/office/drawing/2010/main" xmlns="" id="{B17E6D21-F120-4919-9EFA-F925BD0C1809}"/>
               </a:ext>
             </a:extLst>
           </p:cNvPr>
@@ -720,7 +720,7 @@
             <p:cNvPr id="16" name="Freeform 13">
               <a:extLst>
                 <a:ext uri="{FF2B5EF4-FFF2-40B4-BE49-F238E27FC236}">
-                  <a16:creationId xmlns="" xmlns:a14="http://schemas.microsoft.com/office/drawing/2010/main" xmlns:p14="http://schemas.microsoft.com/office/powerpoint/2010/main" xmlns:a16="http://schemas.microsoft.com/office/drawing/2014/main" id="{A3C2E16E-7F12-4E00-BE31-42B9F3572256}"/>
+                  <a16:creationId xmlns:a16="http://schemas.microsoft.com/office/drawing/2014/main" xmlns:p14="http://schemas.microsoft.com/office/powerpoint/2010/main" xmlns:a14="http://schemas.microsoft.com/office/drawing/2010/main" xmlns="" id="{A3C2E16E-7F12-4E00-BE31-42B9F3572256}"/>
                 </a:ext>
               </a:extLst>
             </p:cNvPr>
@@ -844,7 +844,7 @@
             <p:cNvPr id="21" name="Freeform 13">
               <a:extLst>
                 <a:ext uri="{FF2B5EF4-FFF2-40B4-BE49-F238E27FC236}">
-                  <a16:creationId xmlns="" xmlns:a14="http://schemas.microsoft.com/office/drawing/2010/main" xmlns:p14="http://schemas.microsoft.com/office/powerpoint/2010/main" xmlns:a16="http://schemas.microsoft.com/office/drawing/2014/main" id="{51488BE8-69EC-4A9A-8369-E63E8941B4D1}"/>
+                  <a16:creationId xmlns:a16="http://schemas.microsoft.com/office/drawing/2014/main" xmlns:p14="http://schemas.microsoft.com/office/powerpoint/2010/main" xmlns:a14="http://schemas.microsoft.com/office/drawing/2010/main" xmlns="" id="{51488BE8-69EC-4A9A-8369-E63E8941B4D1}"/>
                 </a:ext>
               </a:extLst>
             </p:cNvPr>
@@ -955,7 +955,7 @@
             <p:cNvPr id="23" name="Freeform 17">
               <a:extLst>
                 <a:ext uri="{FF2B5EF4-FFF2-40B4-BE49-F238E27FC236}">
-                  <a16:creationId xmlns="" xmlns:a14="http://schemas.microsoft.com/office/drawing/2010/main" xmlns:p14="http://schemas.microsoft.com/office/powerpoint/2010/main" xmlns:a16="http://schemas.microsoft.com/office/drawing/2014/main" id="{52B0F295-D75B-467D-B253-DA283681346B}"/>
+                  <a16:creationId xmlns:a16="http://schemas.microsoft.com/office/drawing/2014/main" xmlns:p14="http://schemas.microsoft.com/office/powerpoint/2010/main" xmlns:a14="http://schemas.microsoft.com/office/drawing/2010/main" xmlns="" id="{52B0F295-D75B-467D-B253-DA283681346B}"/>
                 </a:ext>
               </a:extLst>
             </p:cNvPr>
@@ -1293,7 +1293,7 @@
           <p:cNvPr id="4" name="Freeform 13">
             <a:extLst>
               <a:ext uri="{FF2B5EF4-FFF2-40B4-BE49-F238E27FC236}">
-                <a16:creationId xmlns="" xmlns:p14="http://schemas.microsoft.com/office/powerpoint/2010/main" xmlns:a16="http://schemas.microsoft.com/office/drawing/2014/main" id="{6E0A0000-C9EC-41F9-9457-6F2EC527F0AC}"/>
+                <a16:creationId xmlns:a16="http://schemas.microsoft.com/office/drawing/2014/main" xmlns:p14="http://schemas.microsoft.com/office/powerpoint/2010/main" xmlns="" id="{6E0A0000-C9EC-41F9-9457-6F2EC527F0AC}"/>
               </a:ext>
             </a:extLst>
           </p:cNvPr>
@@ -1597,7 +1597,7 @@
           <p:cNvPr id="3" name="日期占位符 2">
             <a:extLst>
               <a:ext uri="{FF2B5EF4-FFF2-40B4-BE49-F238E27FC236}">
-                <a16:creationId xmlns="" xmlns:p14="http://schemas.microsoft.com/office/powerpoint/2010/main" xmlns:a16="http://schemas.microsoft.com/office/drawing/2014/main" id="{9888B6D7-9D3F-49D7-BACE-73A9D1149A74}"/>
+                <a16:creationId xmlns:a16="http://schemas.microsoft.com/office/drawing/2014/main" xmlns:p14="http://schemas.microsoft.com/office/powerpoint/2010/main" xmlns="" id="{9888B6D7-9D3F-49D7-BACE-73A9D1149A74}"/>
               </a:ext>
             </a:extLst>
           </p:cNvPr>
@@ -1622,7 +1622,7 @@
           <p:cNvPr id="4" name="页脚占位符 3">
             <a:extLst>
               <a:ext uri="{FF2B5EF4-FFF2-40B4-BE49-F238E27FC236}">
-                <a16:creationId xmlns="" xmlns:p14="http://schemas.microsoft.com/office/powerpoint/2010/main" xmlns:a16="http://schemas.microsoft.com/office/drawing/2014/main" id="{7AC997A4-1DD8-4731-B9FD-42398A20FF85}"/>
+                <a16:creationId xmlns:a16="http://schemas.microsoft.com/office/drawing/2014/main" xmlns:p14="http://schemas.microsoft.com/office/powerpoint/2010/main" xmlns="" id="{7AC997A4-1DD8-4731-B9FD-42398A20FF85}"/>
               </a:ext>
             </a:extLst>
           </p:cNvPr>
@@ -1659,7 +1659,7 @@
           <p:cNvPr id="5" name="灯片编号占位符 4">
             <a:extLst>
               <a:ext uri="{FF2B5EF4-FFF2-40B4-BE49-F238E27FC236}">
-                <a16:creationId xmlns="" xmlns:p14="http://schemas.microsoft.com/office/powerpoint/2010/main" xmlns:a16="http://schemas.microsoft.com/office/drawing/2014/main" id="{DBA9825E-1876-42AD-ABCF-E0E100F351CA}"/>
+                <a16:creationId xmlns:a16="http://schemas.microsoft.com/office/drawing/2014/main" xmlns:p14="http://schemas.microsoft.com/office/powerpoint/2010/main" xmlns="" id="{DBA9825E-1876-42AD-ABCF-E0E100F351CA}"/>
               </a:ext>
             </a:extLst>
           </p:cNvPr>
@@ -1689,7 +1689,7 @@
           <p:cNvPr id="6" name="标题 5">
             <a:extLst>
               <a:ext uri="{FF2B5EF4-FFF2-40B4-BE49-F238E27FC236}">
-                <a16:creationId xmlns="" xmlns:p14="http://schemas.microsoft.com/office/powerpoint/2010/main" xmlns:a16="http://schemas.microsoft.com/office/drawing/2014/main" id="{D124F9DB-C87A-423F-9657-38C7A2901430}"/>
+                <a16:creationId xmlns:a16="http://schemas.microsoft.com/office/drawing/2014/main" xmlns:p14="http://schemas.microsoft.com/office/powerpoint/2010/main" xmlns="" id="{D124F9DB-C87A-423F-9657-38C7A2901430}"/>
               </a:ext>
             </a:extLst>
           </p:cNvPr>
@@ -1722,7 +1722,7 @@
           <p:cNvPr id="8" name="内容占位符 7">
             <a:extLst>
               <a:ext uri="{FF2B5EF4-FFF2-40B4-BE49-F238E27FC236}">
-                <a16:creationId xmlns="" xmlns:p14="http://schemas.microsoft.com/office/powerpoint/2010/main" xmlns:a16="http://schemas.microsoft.com/office/drawing/2014/main" id="{2070191C-4093-409C-8FD5-7369A79637AD}"/>
+                <a16:creationId xmlns:a16="http://schemas.microsoft.com/office/drawing/2014/main" xmlns:p14="http://schemas.microsoft.com/office/powerpoint/2010/main" xmlns="" id="{2070191C-4093-409C-8FD5-7369A79637AD}"/>
               </a:ext>
             </a:extLst>
           </p:cNvPr>
@@ -1831,7 +1831,7 @@
           <p:cNvPr id="2" name="Title 1">
             <a:extLst>
               <a:ext uri="{FF2B5EF4-FFF2-40B4-BE49-F238E27FC236}">
-                <a16:creationId xmlns="" xmlns:a16="http://schemas.microsoft.com/office/drawing/2014/main" id="{F21C7A1C-3684-4AAF-A408-C63B6CB64104}"/>
+                <a16:creationId xmlns:a16="http://schemas.microsoft.com/office/drawing/2014/main" xmlns="" id="{F21C7A1C-3684-4AAF-A408-C63B6CB64104}"/>
               </a:ext>
             </a:extLst>
           </p:cNvPr>
@@ -1864,7 +1864,7 @@
           <p:cNvPr id="3" name="Date Placeholder 2">
             <a:extLst>
               <a:ext uri="{FF2B5EF4-FFF2-40B4-BE49-F238E27FC236}">
-                <a16:creationId xmlns="" xmlns:a16="http://schemas.microsoft.com/office/drawing/2014/main" id="{8986EA5F-D77D-4318-90E9-C04AA8ADC0D1}"/>
+                <a16:creationId xmlns:a16="http://schemas.microsoft.com/office/drawing/2014/main" xmlns="" id="{8986EA5F-D77D-4318-90E9-C04AA8ADC0D1}"/>
               </a:ext>
             </a:extLst>
           </p:cNvPr>
@@ -1889,7 +1889,7 @@
           <p:cNvPr id="4" name="Footer Placeholder 3">
             <a:extLst>
               <a:ext uri="{FF2B5EF4-FFF2-40B4-BE49-F238E27FC236}">
-                <a16:creationId xmlns="" xmlns:a16="http://schemas.microsoft.com/office/drawing/2014/main" id="{00832621-D9D9-445E-BFF9-F8348FA1E262}"/>
+                <a16:creationId xmlns:a16="http://schemas.microsoft.com/office/drawing/2014/main" xmlns="" id="{00832621-D9D9-445E-BFF9-F8348FA1E262}"/>
               </a:ext>
             </a:extLst>
           </p:cNvPr>
@@ -1926,7 +1926,7 @@
           <p:cNvPr id="5" name="Slide Number Placeholder 4">
             <a:extLst>
               <a:ext uri="{FF2B5EF4-FFF2-40B4-BE49-F238E27FC236}">
-                <a16:creationId xmlns="" xmlns:a16="http://schemas.microsoft.com/office/drawing/2014/main" id="{8371151B-F790-4A9F-962F-B8718A9560A9}"/>
+                <a16:creationId xmlns:a16="http://schemas.microsoft.com/office/drawing/2014/main" xmlns="" id="{8371151B-F790-4A9F-962F-B8718A9560A9}"/>
               </a:ext>
             </a:extLst>
           </p:cNvPr>
@@ -2016,7 +2016,7 @@
           <p:cNvPr id="5" name="组合 4">
             <a:extLst>
               <a:ext uri="{FF2B5EF4-FFF2-40B4-BE49-F238E27FC236}">
-                <a16:creationId xmlns="" xmlns:a14="http://schemas.microsoft.com/office/drawing/2010/main" xmlns:p14="http://schemas.microsoft.com/office/powerpoint/2010/main" xmlns:a16="http://schemas.microsoft.com/office/drawing/2014/main" id="{99391505-0ED0-4506-936F-52505EF1686C}"/>
+                <a16:creationId xmlns:a16="http://schemas.microsoft.com/office/drawing/2014/main" xmlns:p14="http://schemas.microsoft.com/office/powerpoint/2010/main" xmlns:a14="http://schemas.microsoft.com/office/drawing/2010/main" xmlns="" id="{99391505-0ED0-4506-936F-52505EF1686C}"/>
               </a:ext>
             </a:extLst>
           </p:cNvPr>
@@ -2036,7 +2036,7 @@
             <p:cNvPr id="7" name="Freeform 13">
               <a:extLst>
                 <a:ext uri="{FF2B5EF4-FFF2-40B4-BE49-F238E27FC236}">
-                  <a16:creationId xmlns="" xmlns:a14="http://schemas.microsoft.com/office/drawing/2010/main" xmlns:p14="http://schemas.microsoft.com/office/powerpoint/2010/main" xmlns:a16="http://schemas.microsoft.com/office/drawing/2014/main" id="{FC465888-34E2-4A7E-80D2-92BBD9280BD9}"/>
+                  <a16:creationId xmlns:a16="http://schemas.microsoft.com/office/drawing/2014/main" xmlns:p14="http://schemas.microsoft.com/office/powerpoint/2010/main" xmlns:a14="http://schemas.microsoft.com/office/drawing/2010/main" xmlns="" id="{FC465888-34E2-4A7E-80D2-92BBD9280BD9}"/>
                 </a:ext>
               </a:extLst>
             </p:cNvPr>
@@ -2160,7 +2160,7 @@
             <p:cNvPr id="8" name="Freeform 13">
               <a:extLst>
                 <a:ext uri="{FF2B5EF4-FFF2-40B4-BE49-F238E27FC236}">
-                  <a16:creationId xmlns="" xmlns:a14="http://schemas.microsoft.com/office/drawing/2010/main" xmlns:p14="http://schemas.microsoft.com/office/powerpoint/2010/main" xmlns:a16="http://schemas.microsoft.com/office/drawing/2014/main" id="{549CC44A-F314-499E-846A-FB8F04ED3E0C}"/>
+                  <a16:creationId xmlns:a16="http://schemas.microsoft.com/office/drawing/2014/main" xmlns:p14="http://schemas.microsoft.com/office/powerpoint/2010/main" xmlns:a14="http://schemas.microsoft.com/office/drawing/2010/main" xmlns="" id="{549CC44A-F314-499E-846A-FB8F04ED3E0C}"/>
                 </a:ext>
               </a:extLst>
             </p:cNvPr>
@@ -2271,7 +2271,7 @@
             <p:cNvPr id="9" name="Freeform 17">
               <a:extLst>
                 <a:ext uri="{FF2B5EF4-FFF2-40B4-BE49-F238E27FC236}">
-                  <a16:creationId xmlns="" xmlns:a14="http://schemas.microsoft.com/office/drawing/2010/main" xmlns:p14="http://schemas.microsoft.com/office/powerpoint/2010/main" xmlns:a16="http://schemas.microsoft.com/office/drawing/2014/main" id="{9FC0C4B5-6A75-4A11-962E-91FE2C70F846}"/>
+                  <a16:creationId xmlns:a16="http://schemas.microsoft.com/office/drawing/2014/main" xmlns:p14="http://schemas.microsoft.com/office/powerpoint/2010/main" xmlns:a14="http://schemas.microsoft.com/office/drawing/2010/main" xmlns="" id="{9FC0C4B5-6A75-4A11-962E-91FE2C70F846}"/>
                 </a:ext>
               </a:extLst>
             </p:cNvPr>
@@ -2458,7 +2458,7 @@
           <p:cNvPr id="6" name="文本占位符 13">
             <a:extLst>
               <a:ext uri="{FF2B5EF4-FFF2-40B4-BE49-F238E27FC236}">
-                <a16:creationId xmlns="" xmlns:a14="http://schemas.microsoft.com/office/drawing/2010/main" xmlns:p14="http://schemas.microsoft.com/office/powerpoint/2010/main" xmlns:a16="http://schemas.microsoft.com/office/drawing/2014/main" id="{05EBDA4F-7210-4CAE-8333-80DB24212E78}"/>
+                <a16:creationId xmlns:a16="http://schemas.microsoft.com/office/drawing/2014/main" xmlns:p14="http://schemas.microsoft.com/office/powerpoint/2010/main" xmlns:a14="http://schemas.microsoft.com/office/drawing/2010/main" xmlns="" id="{05EBDA4F-7210-4CAE-8333-80DB24212E78}"/>
               </a:ext>
             </a:extLst>
           </p:cNvPr>
@@ -2690,7 +2690,7 @@
           <p:cNvPr id="8" name="日期占位符 3">
             <a:extLst>
               <a:ext uri="{FF2B5EF4-FFF2-40B4-BE49-F238E27FC236}">
-                <a16:creationId xmlns="" xmlns:p14="http://schemas.microsoft.com/office/powerpoint/2010/main" xmlns:p15="http://schemas.microsoft.com/office/powerpoint/2012/main" xmlns:a16="http://schemas.microsoft.com/office/drawing/2014/main" id="{04388434-9949-479C-A9C3-67A953F6A939}"/>
+                <a16:creationId xmlns:a16="http://schemas.microsoft.com/office/drawing/2014/main" xmlns:p15="http://schemas.microsoft.com/office/powerpoint/2012/main" xmlns:p14="http://schemas.microsoft.com/office/powerpoint/2010/main" xmlns="" id="{04388434-9949-479C-A9C3-67A953F6A939}"/>
               </a:ext>
             </a:extLst>
           </p:cNvPr>
@@ -2734,7 +2734,7 @@
           <p:cNvPr id="9" name="页脚占位符 4">
             <a:extLst>
               <a:ext uri="{FF2B5EF4-FFF2-40B4-BE49-F238E27FC236}">
-                <a16:creationId xmlns="" xmlns:p14="http://schemas.microsoft.com/office/powerpoint/2010/main" xmlns:p15="http://schemas.microsoft.com/office/powerpoint/2012/main" xmlns:a16="http://schemas.microsoft.com/office/drawing/2014/main" id="{50A5656E-7A33-4865-A262-1F96263BAA16}"/>
+                <a16:creationId xmlns:a16="http://schemas.microsoft.com/office/drawing/2014/main" xmlns:p15="http://schemas.microsoft.com/office/powerpoint/2012/main" xmlns:p14="http://schemas.microsoft.com/office/powerpoint/2010/main" xmlns="" id="{50A5656E-7A33-4865-A262-1F96263BAA16}"/>
               </a:ext>
             </a:extLst>
           </p:cNvPr>
@@ -2790,7 +2790,7 @@
           <p:cNvPr id="10" name="灯片编号占位符 5">
             <a:extLst>
               <a:ext uri="{FF2B5EF4-FFF2-40B4-BE49-F238E27FC236}">
-                <a16:creationId xmlns="" xmlns:p14="http://schemas.microsoft.com/office/powerpoint/2010/main" xmlns:p15="http://schemas.microsoft.com/office/powerpoint/2012/main" xmlns:a16="http://schemas.microsoft.com/office/drawing/2014/main" id="{5BF52F79-380E-4278-8B67-588AFE5840F9}"/>
+                <a16:creationId xmlns:a16="http://schemas.microsoft.com/office/drawing/2014/main" xmlns:p15="http://schemas.microsoft.com/office/powerpoint/2012/main" xmlns:p14="http://schemas.microsoft.com/office/powerpoint/2010/main" xmlns="" id="{5BF52F79-380E-4278-8B67-588AFE5840F9}"/>
               </a:ext>
             </a:extLst>
           </p:cNvPr>
@@ -3133,7 +3133,7 @@
   </p:txStyles>
   <p:extLst mod="1">
     <p:ext uri="{27BBF7A9-308A-43DC-89C8-2F10F3537804}">
-      <p15:sldGuideLst xmlns="" xmlns:a16="http://schemas.microsoft.com/office/drawing/2014/main" xmlns:p14="http://schemas.microsoft.com/office/powerpoint/2010/main" xmlns:p15="http://schemas.microsoft.com/office/powerpoint/2012/main">
+      <p15:sldGuideLst xmlns:p15="http://schemas.microsoft.com/office/powerpoint/2012/main" xmlns:p14="http://schemas.microsoft.com/office/powerpoint/2010/main" xmlns:a16="http://schemas.microsoft.com/office/drawing/2014/main" xmlns="">
         <p15:guide id="1" pos="422" userDrawn="1">
           <p15:clr>
             <a:srgbClr val="F26B43"/>
@@ -3192,7 +3192,7 @@
           <p:cNvPr id="3" name="对象 2" hidden="1">
             <a:extLst>
               <a:ext uri="{FF2B5EF4-FFF2-40B4-BE49-F238E27FC236}">
-                <a16:creationId xmlns="" xmlns:p14="http://schemas.microsoft.com/office/powerpoint/2010/main" xmlns:mc="http://schemas.openxmlformats.org/markup-compatibility/2006" xmlns:v="urn:schemas-microsoft-com:vml" xmlns:a16="http://schemas.microsoft.com/office/drawing/2014/main" id="{3C326D0B-7DAB-41B6-8030-2E4A18CC949B}"/>
+                <a16:creationId xmlns:a16="http://schemas.microsoft.com/office/drawing/2014/main" xmlns:v="urn:schemas-microsoft-com:vml" xmlns:mc="http://schemas.openxmlformats.org/markup-compatibility/2006" xmlns:p14="http://schemas.microsoft.com/office/powerpoint/2010/main" xmlns="" id="{3C326D0B-7DAB-41B6-8030-2E4A18CC949B}"/>
               </a:ext>
             </a:extLst>
           </p:cNvPr>
@@ -3215,7 +3215,7 @@
           <a:graphicData uri="http://schemas.openxmlformats.org/presentationml/2006/ole">
             <mc:AlternateContent xmlns:mc="http://schemas.openxmlformats.org/markup-compatibility/2006">
               <mc:Choice xmlns:v="urn:schemas-microsoft-com:vml" Requires="v">
-                <p:oleObj spid="_x0000_s1116" name="think-cell Slide" r:id="rId5" imgW="347" imgH="348" progId="TCLayout.ActiveDocument.1">
+                <p:oleObj spid="_x0000_s1118" name="think-cell Slide" r:id="rId5" imgW="347" imgH="348" progId="TCLayout.ActiveDocument.1">
                   <p:embed/>
                 </p:oleObj>
               </mc:Choice>
@@ -3227,7 +3227,7 @@
                       <p:cNvPr id="3" name="对象 2" hidden="1">
                         <a:extLst>
                           <a:ext uri="{FF2B5EF4-FFF2-40B4-BE49-F238E27FC236}">
-                            <a16:creationId xmlns="" xmlns:p14="http://schemas.microsoft.com/office/powerpoint/2010/main" xmlns:v="urn:schemas-microsoft-com:vml" xmlns:a16="http://schemas.microsoft.com/office/drawing/2014/main" id="{3C326D0B-7DAB-41B6-8030-2E4A18CC949B}"/>
+                            <a16:creationId xmlns:a16="http://schemas.microsoft.com/office/drawing/2014/main" xmlns:v="urn:schemas-microsoft-com:vml" xmlns:p14="http://schemas.microsoft.com/office/powerpoint/2010/main" xmlns="" id="{3C326D0B-7DAB-41B6-8030-2E4A18CC949B}"/>
                           </a:ext>
                         </a:extLst>
                       </p:cNvPr>
@@ -3261,7 +3261,7 @@
           <p:cNvPr id="2" name="矩形 1" hidden="1">
             <a:extLst>
               <a:ext uri="{FF2B5EF4-FFF2-40B4-BE49-F238E27FC236}">
-                <a16:creationId xmlns="" xmlns:p14="http://schemas.microsoft.com/office/powerpoint/2010/main" xmlns:mc="http://schemas.openxmlformats.org/markup-compatibility/2006" xmlns:v="urn:schemas-microsoft-com:vml" xmlns:a16="http://schemas.microsoft.com/office/drawing/2014/main" id="{EC933494-1B63-4A32-964F-D05236799BAA}"/>
+                <a16:creationId xmlns:a16="http://schemas.microsoft.com/office/drawing/2014/main" xmlns:v="urn:schemas-microsoft-com:vml" xmlns:mc="http://schemas.openxmlformats.org/markup-compatibility/2006" xmlns:p14="http://schemas.microsoft.com/office/powerpoint/2010/main" xmlns="" id="{EC933494-1B63-4A32-964F-D05236799BAA}"/>
               </a:ext>
             </a:extLst>
           </p:cNvPr>
@@ -3525,7 +3525,7 @@
           <p:cNvPr id="9" name="文本框 8">
             <a:extLst>
               <a:ext uri="{FF2B5EF4-FFF2-40B4-BE49-F238E27FC236}">
-                <a16:creationId xmlns="" xmlns:p14="http://schemas.microsoft.com/office/powerpoint/2010/main" xmlns:a16="http://schemas.microsoft.com/office/drawing/2014/main" id="{04F69230-F3A6-4586-9371-A858F4763E9F}"/>
+                <a16:creationId xmlns:a16="http://schemas.microsoft.com/office/drawing/2014/main" xmlns:p14="http://schemas.microsoft.com/office/powerpoint/2010/main" xmlns="" id="{04F69230-F3A6-4586-9371-A858F4763E9F}"/>
               </a:ext>
             </a:extLst>
           </p:cNvPr>
@@ -3582,7 +3582,7 @@
                 <a:latin typeface="Impact" panose="020B0806030902050204" pitchFamily="34" charset="0"/>
                 <a:cs typeface="Arial" panose="020B0604020202020204" pitchFamily="34" charset="0"/>
               </a:rPr>
-              <a:t>02</a:t>
+              <a:t>03</a:t>
             </a:r>
             <a:endParaRPr lang="zh-CN" altLang="en-US" spc="100" dirty="0">
               <a:solidFill>
@@ -4349,11 +4349,7 @@
             </a:r>
             <a:r>
               <a:rPr lang="en-US" altLang="zh-TW" dirty="0" smtClean="0"/>
-              <a:t>.Spring </a:t>
-            </a:r>
-            <a:r>
-              <a:rPr lang="en-US" altLang="zh-TW" dirty="0" smtClean="0"/>
-              <a:t>boot –</a:t>
+              <a:t>.Spring boot –</a:t>
             </a:r>
             <a:r>
               <a:rPr lang="zh-TW" altLang="en-US" dirty="0" smtClean="0"/>
@@ -4632,11 +4628,7 @@
             </a:r>
             <a:r>
               <a:rPr lang="en-US" altLang="zh-TW" dirty="0" smtClean="0"/>
-              <a:t>.Spring </a:t>
-            </a:r>
-            <a:r>
-              <a:rPr lang="en-US" altLang="zh-TW" dirty="0" smtClean="0"/>
-              <a:t>boot –</a:t>
+              <a:t>.Spring boot –</a:t>
             </a:r>
             <a:r>
               <a:rPr lang="zh-TW" altLang="en-US" dirty="0" smtClean="0"/>
@@ -5328,8 +5320,8 @@
           <a:lstStyle/>
           <a:p>
             <a:r>
-              <a:rPr lang="en-US" altLang="zh-TW" dirty="0" smtClean="0"/>
-              <a:t>Temp</a:t>
+              <a:rPr lang="zh-TW" altLang="en-US" dirty="0"/>
+              <a:t>總結</a:t>
             </a:r>
             <a:endParaRPr lang="zh-TW" altLang="en-US" dirty="0"/>
           </a:p>
@@ -5350,48 +5342,266 @@
           <a:bodyPr/>
           <a:lstStyle/>
           <a:p>
+            <a:pPr marL="0" indent="0">
+              <a:buNone/>
+            </a:pPr>
+            <a:endParaRPr lang="en-US" altLang="zh-TW" dirty="0" smtClean="0"/>
+          </a:p>
+          <a:p>
+            <a:pPr marL="0" indent="0">
+              <a:buNone/>
+            </a:pPr>
+            <a:r>
+              <a:rPr lang="zh-TW" altLang="en-US" dirty="0" smtClean="0"/>
+              <a:t>相對 </a:t>
+            </a:r>
             <a:r>
               <a:rPr lang="en-US" altLang="zh-TW" dirty="0" smtClean="0"/>
-              <a:t>Short introduce :</a:t>
-            </a:r>
-          </a:p>
-          <a:p>
-            <a:r>
-              <a:rPr lang="en-US" altLang="zh-TW" dirty="0" err="1" smtClean="0"/>
-              <a:t>Ioc</a:t>
-            </a:r>
+              <a:t>SSM</a:t>
+            </a:r>
+            <a:r>
+              <a:rPr lang="zh-TW" altLang="en-US" dirty="0" smtClean="0"/>
+              <a:t>框架來說</a:t>
+            </a:r>
+            <a:r>
+              <a:rPr lang="en-US" altLang="zh-TW" dirty="0" smtClean="0"/>
+              <a:t>,</a:t>
+            </a:r>
+            <a:r>
+              <a:rPr lang="zh-TW" altLang="en-US" dirty="0" smtClean="0"/>
+              <a:t>方便使用許多</a:t>
+            </a:r>
+            <a:r>
+              <a:rPr lang="en-US" altLang="zh-TW" dirty="0" smtClean="0"/>
+              <a:t>.</a:t>
+            </a:r>
+          </a:p>
+          <a:p>
+            <a:pPr marL="0" indent="0">
+              <a:buNone/>
+            </a:pPr>
             <a:endParaRPr lang="en-US" altLang="zh-TW" dirty="0" smtClean="0"/>
+          </a:p>
+          <a:p>
+            <a:pPr marL="0" indent="0">
+              <a:buNone/>
+            </a:pPr>
+            <a:r>
+              <a:rPr lang="zh-TW" altLang="en-US" dirty="0" smtClean="0"/>
+              <a:t>優點</a:t>
+            </a:r>
+            <a:r>
+              <a:rPr lang="en-US" altLang="zh-TW" dirty="0" smtClean="0"/>
+              <a:t>:</a:t>
+            </a:r>
+          </a:p>
+          <a:p>
+            <a:pPr marL="0" indent="0">
+              <a:buNone/>
+            </a:pPr>
+            <a:r>
+              <a:rPr lang="en-US" altLang="zh-TW" dirty="0" smtClean="0"/>
+              <a:t>1.</a:t>
+            </a:r>
+            <a:r>
+              <a:rPr lang="zh-TW" altLang="en-US" dirty="0" smtClean="0"/>
+              <a:t>簡單的功能連配置都不用直接引</a:t>
+            </a:r>
+            <a:r>
+              <a:rPr lang="en-US" altLang="zh-TW" dirty="0" smtClean="0"/>
+              <a:t>lib</a:t>
+            </a:r>
+            <a:r>
+              <a:rPr lang="zh-TW" altLang="en-US" dirty="0" smtClean="0"/>
+              <a:t>即可 </a:t>
+            </a:r>
+            <a:r>
+              <a:rPr lang="en-US" altLang="zh-TW" dirty="0" smtClean="0"/>
+              <a:t>(</a:t>
+            </a:r>
+            <a:r>
+              <a:rPr lang="zh-TW" altLang="en-US" dirty="0" smtClean="0"/>
+              <a:t>自動預設配置</a:t>
+            </a:r>
+            <a:r>
+              <a:rPr lang="en-US" altLang="zh-TW" dirty="0" smtClean="0"/>
+              <a:t>)</a:t>
+            </a:r>
+          </a:p>
+          <a:p>
+            <a:pPr marL="0" indent="0">
+              <a:buNone/>
+            </a:pPr>
+            <a:r>
+              <a:rPr lang="en-US" altLang="zh-TW" dirty="0" smtClean="0"/>
+              <a:t>2.</a:t>
+            </a:r>
+            <a:r>
+              <a:rPr lang="zh-TW" altLang="en-US" dirty="0" smtClean="0"/>
+              <a:t> 大多數的配置 直接寫在</a:t>
+            </a:r>
+            <a:r>
+              <a:rPr lang="en-US" altLang="zh-TW" dirty="0" smtClean="0"/>
+              <a:t>xml</a:t>
+            </a:r>
+            <a:r>
+              <a:rPr lang="zh-TW" altLang="en-US" dirty="0" smtClean="0"/>
+              <a:t>設定檔即可</a:t>
+            </a:r>
+            <a:r>
+              <a:rPr lang="en-US" altLang="zh-TW" dirty="0" smtClean="0"/>
+              <a:t>(</a:t>
+            </a:r>
+            <a:r>
+              <a:rPr lang="zh-TW" altLang="en-US" dirty="0" smtClean="0"/>
+              <a:t>要寫在</a:t>
+            </a:r>
+            <a:r>
+              <a:rPr lang="en-US" altLang="zh-TW" dirty="0" smtClean="0"/>
+              <a:t>JAVA</a:t>
+            </a:r>
+            <a:r>
+              <a:rPr lang="zh-TW" altLang="en-US" dirty="0" smtClean="0"/>
+              <a:t>當然也可以</a:t>
+            </a:r>
+            <a:r>
+              <a:rPr lang="en-US" altLang="zh-TW" dirty="0" smtClean="0"/>
+              <a:t>)</a:t>
+            </a:r>
+          </a:p>
+          <a:p>
+            <a:pPr marL="0" indent="0">
+              <a:buNone/>
+            </a:pPr>
+            <a:endParaRPr lang="en-US" altLang="zh-TW" dirty="0" smtClean="0"/>
+          </a:p>
+          <a:p>
+            <a:pPr marL="0" indent="0">
+              <a:buNone/>
+            </a:pPr>
+            <a:r>
+              <a:rPr lang="zh-TW" altLang="en-US" dirty="0" smtClean="0"/>
+              <a:t>缺點</a:t>
+            </a:r>
+            <a:r>
+              <a:rPr lang="en-US" altLang="zh-TW" dirty="0" smtClean="0"/>
+              <a:t>:</a:t>
+            </a:r>
+          </a:p>
+          <a:p>
+            <a:pPr marL="0" indent="0">
+              <a:buNone/>
+            </a:pPr>
+            <a:r>
+              <a:rPr lang="zh-TW" altLang="en-US" dirty="0" smtClean="0"/>
+              <a:t>自動配置是個兩面刃</a:t>
+            </a:r>
+            <a:r>
+              <a:rPr lang="en-US" altLang="zh-TW" dirty="0" smtClean="0"/>
+              <a:t>,</a:t>
+            </a:r>
+            <a:r>
+              <a:rPr lang="zh-TW" altLang="en-US" dirty="0" smtClean="0"/>
+              <a:t>很難去追內部怎麼運作</a:t>
+            </a:r>
+            <a:r>
+              <a:rPr lang="en-US" altLang="zh-TW" dirty="0" smtClean="0"/>
+              <a:t>,</a:t>
+            </a:r>
+            <a:r>
+              <a:rPr lang="zh-TW" altLang="en-US" dirty="0" smtClean="0"/>
+              <a:t>這是其一</a:t>
+            </a:r>
+            <a:r>
+              <a:rPr lang="en-US" altLang="zh-TW" dirty="0" smtClean="0"/>
+              <a:t>,</a:t>
+            </a:r>
+          </a:p>
+          <a:p>
+            <a:pPr marL="0" indent="0">
+              <a:buNone/>
+            </a:pPr>
+            <a:r>
+              <a:rPr lang="zh-TW" altLang="en-US" dirty="0"/>
+              <a:t>第二</a:t>
+            </a:r>
+            <a:r>
+              <a:rPr lang="zh-TW" altLang="en-US" dirty="0" smtClean="0"/>
+              <a:t>是</a:t>
+            </a:r>
+            <a:r>
+              <a:rPr lang="en-US" altLang="zh-TW" dirty="0" smtClean="0"/>
+              <a:t>starter</a:t>
+            </a:r>
+            <a:r>
+              <a:rPr lang="zh-TW" altLang="en-US" dirty="0" smtClean="0"/>
+              <a:t>的包都給你裝配好</a:t>
+            </a:r>
+            <a:r>
+              <a:rPr lang="en-US" altLang="zh-TW" dirty="0" smtClean="0"/>
+              <a:t>,</a:t>
+            </a:r>
+            <a:r>
+              <a:rPr lang="zh-TW" altLang="en-US" dirty="0" smtClean="0"/>
+              <a:t> 不同的</a:t>
+            </a:r>
+            <a:r>
+              <a:rPr lang="en-US" altLang="zh-TW" dirty="0" smtClean="0"/>
+              <a:t>starter</a:t>
+            </a:r>
+            <a:r>
+              <a:rPr lang="zh-TW" altLang="en-US" dirty="0" smtClean="0"/>
+              <a:t>裡面可能有相同的依賴包</a:t>
+            </a:r>
+            <a:r>
+              <a:rPr lang="en-US" altLang="zh-TW" dirty="0" smtClean="0"/>
+              <a:t>,</a:t>
+            </a:r>
+            <a:r>
+              <a:rPr lang="zh-TW" altLang="en-US" dirty="0" smtClean="0"/>
+              <a:t>但是版本不同</a:t>
+            </a:r>
+            <a:r>
+              <a:rPr lang="en-US" altLang="zh-TW" dirty="0" smtClean="0"/>
+              <a:t>,</a:t>
+            </a:r>
+          </a:p>
+          <a:p>
+            <a:pPr marL="0" indent="0">
+              <a:buNone/>
+            </a:pPr>
+            <a:r>
+              <a:rPr lang="zh-TW" altLang="en-US" dirty="0"/>
+              <a:t>有時候會</a:t>
+            </a:r>
+            <a:r>
+              <a:rPr lang="zh-TW" altLang="en-US" dirty="0" smtClean="0"/>
+              <a:t>衝突</a:t>
+            </a:r>
+            <a:r>
+              <a:rPr lang="en-US" altLang="zh-TW" dirty="0" smtClean="0"/>
+              <a:t>,</a:t>
+            </a:r>
+            <a:r>
+              <a:rPr lang="zh-TW" altLang="en-US" dirty="0" smtClean="0"/>
+              <a:t>這還得去追依賴引用解決問題</a:t>
+            </a:r>
+            <a:r>
+              <a:rPr lang="en-US" altLang="zh-TW" smtClean="0"/>
+              <a:t>.</a:t>
+            </a:r>
+          </a:p>
+          <a:p>
+            <a:pPr marL="0" indent="0">
+              <a:buNone/>
+            </a:pPr>
+            <a:endParaRPr lang="en-US" altLang="zh-TW" smtClean="0"/>
           </a:p>
           <a:p>
             <a:pPr marL="0" indent="0">
               <a:buNone/>
             </a:pPr>
             <a:endParaRPr lang="en-US" altLang="zh-TW" dirty="0"/>
-          </a:p>
-          <a:p>
-            <a:r>
-              <a:rPr lang="en-US" altLang="zh-TW" dirty="0" smtClean="0"/>
-              <a:t> auto configure</a:t>
-            </a:r>
-          </a:p>
-          <a:p>
-            <a:endParaRPr lang="en-US" altLang="zh-TW" dirty="0"/>
-          </a:p>
-          <a:p>
-            <a:r>
-              <a:rPr lang="en-US" altLang="zh-TW" dirty="0" err="1" smtClean="0"/>
-              <a:t>Aop</a:t>
-            </a:r>
-            <a:r>
-              <a:rPr lang="en-US" altLang="zh-TW" dirty="0" smtClean="0"/>
-              <a:t> </a:t>
-            </a:r>
-          </a:p>
-          <a:p>
-            <a:r>
-              <a:rPr lang="en-US" altLang="zh-TW" dirty="0" smtClean="0"/>
-              <a:t>Spring cloud</a:t>
-            </a:r>
           </a:p>
           <a:p>
             <a:pPr marL="0" indent="0">
@@ -5436,7 +5646,7 @@
           <p:cNvPr id="3" name="对象 2" hidden="1">
             <a:extLst>
               <a:ext uri="{FF2B5EF4-FFF2-40B4-BE49-F238E27FC236}">
-                <a16:creationId xmlns="" xmlns:p14="http://schemas.microsoft.com/office/powerpoint/2010/main" xmlns:mc="http://schemas.openxmlformats.org/markup-compatibility/2006" xmlns:v="urn:schemas-microsoft-com:vml" xmlns:a16="http://schemas.microsoft.com/office/drawing/2014/main" id="{A6A819F1-33AF-45D7-8BF6-2B0A9769CAD4}"/>
+                <a16:creationId xmlns:a16="http://schemas.microsoft.com/office/drawing/2014/main" xmlns:v="urn:schemas-microsoft-com:vml" xmlns:mc="http://schemas.openxmlformats.org/markup-compatibility/2006" xmlns:p14="http://schemas.microsoft.com/office/powerpoint/2010/main" xmlns="" id="{A6A819F1-33AF-45D7-8BF6-2B0A9769CAD4}"/>
               </a:ext>
             </a:extLst>
           </p:cNvPr>
@@ -5459,7 +5669,7 @@
           <a:graphicData uri="http://schemas.openxmlformats.org/presentationml/2006/ole">
             <mc:AlternateContent xmlns:mc="http://schemas.openxmlformats.org/markup-compatibility/2006">
               <mc:Choice xmlns:v="urn:schemas-microsoft-com:vml" Requires="v">
-                <p:oleObj spid="_x0000_s3164" name="think-cell Slide" r:id="rId5" imgW="347" imgH="348" progId="TCLayout.ActiveDocument.1">
+                <p:oleObj spid="_x0000_s3166" name="think-cell Slide" r:id="rId5" imgW="347" imgH="348" progId="TCLayout.ActiveDocument.1">
                   <p:embed/>
                 </p:oleObj>
               </mc:Choice>
@@ -5471,7 +5681,7 @@
                       <p:cNvPr id="3" name="对象 2" hidden="1">
                         <a:extLst>
                           <a:ext uri="{FF2B5EF4-FFF2-40B4-BE49-F238E27FC236}">
-                            <a16:creationId xmlns="" xmlns:p14="http://schemas.microsoft.com/office/powerpoint/2010/main" xmlns:v="urn:schemas-microsoft-com:vml" xmlns:a16="http://schemas.microsoft.com/office/drawing/2014/main" id="{A6A819F1-33AF-45D7-8BF6-2B0A9769CAD4}"/>
+                            <a16:creationId xmlns:a16="http://schemas.microsoft.com/office/drawing/2014/main" xmlns:v="urn:schemas-microsoft-com:vml" xmlns:p14="http://schemas.microsoft.com/office/powerpoint/2010/main" xmlns="" id="{A6A819F1-33AF-45D7-8BF6-2B0A9769CAD4}"/>
                           </a:ext>
                         </a:extLst>
                       </p:cNvPr>
@@ -5505,7 +5715,7 @@
           <p:cNvPr id="2" name="矩形 1" hidden="1">
             <a:extLst>
               <a:ext uri="{FF2B5EF4-FFF2-40B4-BE49-F238E27FC236}">
-                <a16:creationId xmlns="" xmlns:p14="http://schemas.microsoft.com/office/powerpoint/2010/main" xmlns:mc="http://schemas.openxmlformats.org/markup-compatibility/2006" xmlns:v="urn:schemas-microsoft-com:vml" xmlns:a16="http://schemas.microsoft.com/office/drawing/2014/main" id="{FF51F16D-1BAD-46EE-A6F4-B8B94C9DF628}"/>
+                <a16:creationId xmlns:a16="http://schemas.microsoft.com/office/drawing/2014/main" xmlns:v="urn:schemas-microsoft-com:vml" xmlns:mc="http://schemas.openxmlformats.org/markup-compatibility/2006" xmlns:p14="http://schemas.microsoft.com/office/powerpoint/2010/main" xmlns="" id="{FF51F16D-1BAD-46EE-A6F4-B8B94C9DF628}"/>
               </a:ext>
             </a:extLst>
           </p:cNvPr>
@@ -5758,7 +5968,7 @@
           <p:cNvPr id="2" name="组合 1">
             <a:extLst>
               <a:ext uri="{FF2B5EF4-FFF2-40B4-BE49-F238E27FC236}">
-                <a16:creationId xmlns="" xmlns:p14="http://schemas.microsoft.com/office/powerpoint/2010/main" xmlns:a16="http://schemas.microsoft.com/office/drawing/2014/main" id="{C0498D3A-B738-48EC-A39C-94C58B88932B}"/>
+                <a16:creationId xmlns:a16="http://schemas.microsoft.com/office/drawing/2014/main" xmlns:p14="http://schemas.microsoft.com/office/powerpoint/2010/main" xmlns="" id="{C0498D3A-B738-48EC-A39C-94C58B88932B}"/>
               </a:ext>
             </a:extLst>
           </p:cNvPr>
@@ -5778,7 +5988,7 @@
             <p:cNvPr id="6" name="2b751056-6b97-492c-b763-340acee7e99d" descr="本素材由iSlide™ 提供&#10;iSlide™尊重知识产权并注重保护用户享有的各项权利。郑重提醒您：&#10;iSlide™插件中提供的任何信息内容的所有权、知识产权归其原始权利人或权利受让人所有，您免费/购买获得的是信息内容的使用权，并受下述条款的约束；&#10;1. 您仅可以个人非商业用途使用该等信息内容，不可将信息内容的全部或部分用于出售，或以出租、出借、转让、分销、发布等其他任何方式供他人使用；&#10;2. 禁止在接入互联网或移动互联网的任何网站、平台、应用或程序上以任何方式为他人提供iSlide™插件资源内容的下载。&#10;The resource is supplied by iSlide™.&#10;iSlide™ respects all intellectual property rights and protects all the rights its users acquired.Solemnly remind you:&#10;The ownership and intellectual property of the resources supplied in iSlide Add-in belongs to its owner or the assignee of this ownership.you only acquired the usage of the resources supplied in iSlide Add-in, as well as respected the following restrain terms:&#10;1.You are only allowed to use such resource for personal and non-commercial aim, not allowed to use such resource or part of it for the sale; or rent, lend, transfer to others; or distribution or release it in any way.&#10;2.You are not permitted to provide the resource of iSlide Add-in in any website, platform, application access to the Internet or mobile Internet." title="iSlide™ 版权声明  COPYRIGHT NOTICE">
               <a:extLst>
                 <a:ext uri="{FF2B5EF4-FFF2-40B4-BE49-F238E27FC236}">
-                  <a16:creationId xmlns="" xmlns:p14="http://schemas.microsoft.com/office/powerpoint/2010/main" xmlns:a16="http://schemas.microsoft.com/office/drawing/2014/main" id="{A759C196-DA28-4241-ABB5-975367026FE9}"/>
+                  <a16:creationId xmlns:a16="http://schemas.microsoft.com/office/drawing/2014/main" xmlns:p14="http://schemas.microsoft.com/office/powerpoint/2010/main" xmlns="" id="{A759C196-DA28-4241-ABB5-975367026FE9}"/>
                 </a:ext>
               </a:extLst>
             </p:cNvPr>
@@ -5800,7 +6010,7 @@
               <p:cNvPr id="7" name="iṡľïḑè">
                 <a:extLst>
                   <a:ext uri="{FF2B5EF4-FFF2-40B4-BE49-F238E27FC236}">
-                    <a16:creationId xmlns="" xmlns:p14="http://schemas.microsoft.com/office/powerpoint/2010/main" xmlns:a16="http://schemas.microsoft.com/office/drawing/2014/main" id="{48F70259-7598-4270-874A-6F50772D10F6}"/>
+                    <a16:creationId xmlns:a16="http://schemas.microsoft.com/office/drawing/2014/main" xmlns:p14="http://schemas.microsoft.com/office/powerpoint/2010/main" xmlns="" id="{48F70259-7598-4270-874A-6F50772D10F6}"/>
                   </a:ext>
                 </a:extLst>
               </p:cNvPr>
@@ -6023,13 +6233,16 @@
                     <a:ea typeface="+mn-ea"/>
                     <a:sym typeface="+mn-lt"/>
                   </a:rPr>
-                  <a:t>Spring boot Framework Introduce</a:t>
+                  <a:t>Spring boot Framework </a:t>
                 </a:r>
-                <a:endParaRPr lang="en-US" altLang="zh-TW" sz="2400" dirty="0" smtClean="0">
-                  <a:latin typeface="+mn-lt"/>
-                  <a:ea typeface="+mn-ea"/>
-                  <a:sym typeface="+mn-lt"/>
-                </a:endParaRPr>
+                <a:r>
+                  <a:rPr lang="en-US" altLang="zh-TW" sz="2400" dirty="0" smtClean="0">
+                    <a:latin typeface="+mn-lt"/>
+                    <a:ea typeface="+mn-ea"/>
+                    <a:sym typeface="+mn-lt"/>
+                  </a:rPr>
+                  <a:t>Introduce</a:t>
+                </a:r>
               </a:p>
               <a:p>
                 <a:pPr marL="342900" indent="-342900">
@@ -6039,7 +6252,7 @@
                   <a:buFont typeface="+mj-lt"/>
                   <a:buAutoNum type="arabicPeriod"/>
                 </a:pPr>
-                <a:endParaRPr lang="en-US" altLang="zh-TW" sz="1800" b="0" dirty="0" smtClean="0">
+                <a:endParaRPr lang="en-US" altLang="zh-TW" sz="2400" dirty="0">
                   <a:latin typeface="+mn-lt"/>
                   <a:ea typeface="+mn-ea"/>
                   <a:sym typeface="+mn-lt"/>
@@ -6054,74 +6267,26 @@
                   <a:buAutoNum type="arabicPeriod"/>
                 </a:pPr>
                 <a:r>
-                  <a:rPr lang="en-US" altLang="zh-CN" sz="2400" b="0" dirty="0" smtClean="0">
+                  <a:rPr lang="zh-TW" altLang="en-US" sz="2400" dirty="0" smtClean="0">
                     <a:latin typeface="+mn-lt"/>
                     <a:ea typeface="+mn-ea"/>
                     <a:sym typeface="+mn-lt"/>
                   </a:rPr>
-                  <a:t> </a:t>
+                  <a:t>總結</a:t>
                 </a:r>
-                <a:r>
-                  <a:rPr lang="en-US" altLang="zh-CN" sz="2400" b="0" dirty="0" smtClean="0">
-                    <a:latin typeface="+mn-lt"/>
-                    <a:ea typeface="+mn-ea"/>
-                    <a:sym typeface="+mn-lt"/>
-                  </a:rPr>
-                  <a:t>Spring boot </a:t>
-                </a:r>
-                <a:r>
-                  <a:rPr lang="en-US" altLang="zh-CN" sz="2400" b="0" dirty="0" err="1" smtClean="0">
-                    <a:latin typeface="+mn-lt"/>
-                    <a:ea typeface="+mn-ea"/>
-                    <a:sym typeface="+mn-lt"/>
-                  </a:rPr>
-                  <a:t>Aop</a:t>
-                </a:r>
-                <a:r>
-                  <a:rPr lang="en-US" altLang="zh-CN" sz="2400" b="0" dirty="0" smtClean="0">
-                    <a:latin typeface="+mn-lt"/>
-                    <a:ea typeface="+mn-ea"/>
-                    <a:sym typeface="+mn-lt"/>
-                  </a:rPr>
-                  <a:t> Introduce</a:t>
-                </a:r>
-                <a:endParaRPr lang="en-US" altLang="zh-CN" sz="2400" b="0" dirty="0" smtClean="0">
+                <a:endParaRPr lang="en-US" altLang="zh-TW" sz="2400" dirty="0" smtClean="0">
                   <a:latin typeface="+mn-lt"/>
                   <a:ea typeface="+mn-ea"/>
                   <a:sym typeface="+mn-lt"/>
                 </a:endParaRPr>
               </a:p>
               <a:p>
-                <a:pPr marL="342900" indent="-342900">
+                <a:pPr>
                   <a:lnSpc>
                     <a:spcPct val="150000"/>
                   </a:lnSpc>
-                  <a:buFont typeface="+mj-lt"/>
-                  <a:buAutoNum type="arabicPeriod"/>
                 </a:pPr>
                 <a:endParaRPr lang="en-US" altLang="zh-CN" sz="1800" b="0" dirty="0" smtClean="0">
-                  <a:latin typeface="+mn-lt"/>
-                  <a:ea typeface="+mn-ea"/>
-                  <a:sym typeface="+mn-lt"/>
-                </a:endParaRPr>
-              </a:p>
-              <a:p>
-                <a:pPr marL="342900" indent="-342900">
-                  <a:lnSpc>
-                    <a:spcPct val="150000"/>
-                  </a:lnSpc>
-                  <a:buFont typeface="+mj-lt"/>
-                  <a:buAutoNum type="arabicPeriod"/>
-                </a:pPr>
-                <a:r>
-                  <a:rPr lang="zh-TW" altLang="en-US" b="0" dirty="0" smtClean="0">
-                    <a:latin typeface="+mn-lt"/>
-                    <a:ea typeface="+mn-ea"/>
-                    <a:sym typeface="+mn-lt"/>
-                  </a:rPr>
-                  <a:t>總結 </a:t>
-                </a:r>
-                <a:endParaRPr lang="en-US" altLang="zh-CN" b="0" dirty="0">
                   <a:latin typeface="+mn-lt"/>
                   <a:ea typeface="+mn-ea"/>
                   <a:sym typeface="+mn-lt"/>
@@ -6134,7 +6299,7 @@
               <p:cNvPr id="8" name="直接连接符 7">
                 <a:extLst>
                   <a:ext uri="{FF2B5EF4-FFF2-40B4-BE49-F238E27FC236}">
-                    <a16:creationId xmlns="" xmlns:p14="http://schemas.microsoft.com/office/powerpoint/2010/main" xmlns:a16="http://schemas.microsoft.com/office/drawing/2014/main" id="{DA1FB18E-FA01-4588-BEF9-FB96A98A84D4}"/>
+                    <a16:creationId xmlns:a16="http://schemas.microsoft.com/office/drawing/2014/main" xmlns:p14="http://schemas.microsoft.com/office/powerpoint/2010/main" xmlns="" id="{DA1FB18E-FA01-4588-BEF9-FB96A98A84D4}"/>
                   </a:ext>
                 </a:extLst>
               </p:cNvPr>
@@ -6173,7 +6338,7 @@
               <p:cNvPr id="9" name="išľïḋé">
                 <a:extLst>
                   <a:ext uri="{FF2B5EF4-FFF2-40B4-BE49-F238E27FC236}">
-                    <a16:creationId xmlns="" xmlns:p14="http://schemas.microsoft.com/office/powerpoint/2010/main" xmlns:a16="http://schemas.microsoft.com/office/drawing/2014/main" id="{0DB1D0A1-2667-455C-9387-D7ABF0A00B8C}"/>
+                    <a16:creationId xmlns:a16="http://schemas.microsoft.com/office/drawing/2014/main" xmlns:p14="http://schemas.microsoft.com/office/powerpoint/2010/main" xmlns="" id="{0DB1D0A1-2667-455C-9387-D7ABF0A00B8C}"/>
                   </a:ext>
                 </a:extLst>
               </p:cNvPr>
@@ -6245,7 +6410,7 @@
             <p:cNvPr id="10" name="poetry_91022">
               <a:extLst>
                 <a:ext uri="{FF2B5EF4-FFF2-40B4-BE49-F238E27FC236}">
-                  <a16:creationId xmlns="" xmlns:p14="http://schemas.microsoft.com/office/powerpoint/2010/main" xmlns:a16="http://schemas.microsoft.com/office/drawing/2014/main" id="{ADAD6BE3-DC11-4582-9F68-50D831ADD001}"/>
+                  <a16:creationId xmlns:a16="http://schemas.microsoft.com/office/drawing/2014/main" xmlns:p14="http://schemas.microsoft.com/office/powerpoint/2010/main" xmlns="" id="{ADAD6BE3-DC11-4582-9F68-50D831ADD001}"/>
                 </a:ext>
               </a:extLst>
             </p:cNvPr>
@@ -6926,7 +7091,7 @@
           <p:cNvPr id="9" name="文本框 8">
             <a:extLst>
               <a:ext uri="{FF2B5EF4-FFF2-40B4-BE49-F238E27FC236}">
-                <a16:creationId xmlns="" xmlns:p14="http://schemas.microsoft.com/office/powerpoint/2010/main" xmlns:a16="http://schemas.microsoft.com/office/drawing/2014/main" id="{04F69230-F3A6-4586-9371-A858F4763E9F}"/>
+                <a16:creationId xmlns:a16="http://schemas.microsoft.com/office/drawing/2014/main" xmlns:p14="http://schemas.microsoft.com/office/powerpoint/2010/main" xmlns="" id="{04F69230-F3A6-4586-9371-A858F4763E9F}"/>
               </a:ext>
             </a:extLst>
           </p:cNvPr>
@@ -7503,7 +7668,7 @@
           <p:cNvPr id="9" name="文本框 8">
             <a:extLst>
               <a:ext uri="{FF2B5EF4-FFF2-40B4-BE49-F238E27FC236}">
-                <a16:creationId xmlns="" xmlns:p14="http://schemas.microsoft.com/office/powerpoint/2010/main" xmlns:a16="http://schemas.microsoft.com/office/drawing/2014/main" id="{04F69230-F3A6-4586-9371-A858F4763E9F}"/>
+                <a16:creationId xmlns:a16="http://schemas.microsoft.com/office/drawing/2014/main" xmlns:p14="http://schemas.microsoft.com/office/powerpoint/2010/main" xmlns="" id="{04F69230-F3A6-4586-9371-A858F4763E9F}"/>
               </a:ext>
             </a:extLst>
           </p:cNvPr>
@@ -7684,11 +7849,7 @@
           <a:p>
             <a:r>
               <a:rPr lang="en-US" altLang="zh-TW" dirty="0" smtClean="0"/>
-              <a:t>2.Spring </a:t>
-            </a:r>
-            <a:r>
-              <a:rPr lang="en-US" altLang="zh-TW" dirty="0" smtClean="0"/>
-              <a:t>–</a:t>
+              <a:t>2.Spring –</a:t>
             </a:r>
             <a:r>
               <a:rPr lang="zh-TW" altLang="en-US" dirty="0" smtClean="0"/>
@@ -8388,11 +8549,7 @@
             </a:r>
             <a:r>
               <a:rPr lang="en-US" altLang="zh-TW" dirty="0" smtClean="0"/>
-              <a:t>) </a:t>
-            </a:r>
-            <a:r>
-              <a:rPr lang="en-US" altLang="zh-TW" dirty="0" smtClean="0"/>
-              <a:t>IOC</a:t>
+              <a:t>) IOC</a:t>
             </a:r>
             <a:r>
               <a:rPr lang="zh-TW" altLang="en-US" dirty="0" smtClean="0"/>
@@ -8725,11 +8882,7 @@
             </a:r>
             <a:r>
               <a:rPr lang="en-US" altLang="zh-TW" dirty="0" smtClean="0"/>
-              <a:t>) </a:t>
-            </a:r>
-            <a:r>
-              <a:rPr lang="en-US" altLang="zh-TW" dirty="0" smtClean="0"/>
-              <a:t>IOC</a:t>
+              <a:t>) IOC</a:t>
             </a:r>
             <a:r>
               <a:rPr lang="zh-TW" altLang="en-US" dirty="0" smtClean="0"/>
@@ -9149,7 +9302,7 @@
   <a:extraClrSchemeLst/>
   <a:extLst>
     <a:ext uri="{05A4C25C-085E-4340-85A3-A5531E510DB2}">
-      <thm15:themeFamily xmlns="" xmlns:thm15="http://schemas.microsoft.com/office/thememl/2012/main" name="主题5" id="{B8EDB911-D765-4A7B-BBC7-40DBB672FBA6}" vid="{AECAB1C0-5DF6-436C-85E8-20094DBE11C0}"/>
+      <thm15:themeFamily xmlns:thm15="http://schemas.microsoft.com/office/thememl/2012/main" xmlns="" name="主题5" id="{B8EDB911-D765-4A7B-BBC7-40DBB672FBA6}" vid="{AECAB1C0-5DF6-436C-85E8-20094DBE11C0}"/>
     </a:ext>
   </a:extLst>
 </a:theme>
@@ -9410,7 +9563,7 @@
   <a:extraClrSchemeLst/>
   <a:extLst>
     <a:ext uri="{05A4C25C-085E-4340-85A3-A5531E510DB2}">
-      <thm15:themeFamily xmlns="" xmlns:thm15="http://schemas.microsoft.com/office/thememl/2012/main" name="Office Theme" id="{62F939B6-93AF-4DB8-9C6B-D6C7DFDC589F}" vid="{4A3C46E8-61CC-4603-A589-7422A47A8E4A}"/>
+      <thm15:themeFamily xmlns:thm15="http://schemas.microsoft.com/office/thememl/2012/main" xmlns="" name="Office Theme" id="{62F939B6-93AF-4DB8-9C6B-D6C7DFDC589F}" vid="{4A3C46E8-61CC-4603-A589-7422A47A8E4A}"/>
     </a:ext>
   </a:extLst>
 </a:theme>
@@ -9705,7 +9858,7 @@
   <a:extraClrSchemeLst/>
   <a:extLst>
     <a:ext uri="{05A4C25C-085E-4340-85A3-A5531E510DB2}">
-      <thm15:themeFamily xmlns="" xmlns:thm15="http://schemas.microsoft.com/office/thememl/2012/main" name="Office Theme" id="{62F939B6-93AF-4DB8-9C6B-D6C7DFDC589F}" vid="{4A3C46E8-61CC-4603-A589-7422A47A8E4A}"/>
+      <thm15:themeFamily xmlns:thm15="http://schemas.microsoft.com/office/thememl/2012/main" xmlns="" name="Office Theme" id="{62F939B6-93AF-4DB8-9C6B-D6C7DFDC589F}" vid="{4A3C46E8-61CC-4603-A589-7422A47A8E4A}"/>
     </a:ext>
   </a:extLst>
 </a:theme>

</xml_diff>

<commit_message>
update spring boot data
</commit_message>
<xml_diff>
--- a/Spring_boot_introduce/Spring Boot Introduce.pptx
+++ b/Spring_boot_introduce/Spring Boot Introduce.pptx
@@ -5,10 +5,10 @@
     <p:sldMasterId id="2147483648" r:id="rId1"/>
   </p:sldMasterIdLst>
   <p:notesMasterIdLst>
-    <p:notesMasterId r:id="rId21"/>
+    <p:notesMasterId r:id="rId23"/>
   </p:notesMasterIdLst>
   <p:handoutMasterIdLst>
-    <p:handoutMasterId r:id="rId22"/>
+    <p:handoutMasterId r:id="rId24"/>
   </p:handoutMasterIdLst>
   <p:sldIdLst>
     <p:sldId id="256" r:id="rId2"/>
@@ -27,14 +27,16 @@
     <p:sldId id="293" r:id="rId15"/>
     <p:sldId id="283" r:id="rId16"/>
     <p:sldId id="290" r:id="rId17"/>
-    <p:sldId id="292" r:id="rId18"/>
-    <p:sldId id="285" r:id="rId19"/>
-    <p:sldId id="261" r:id="rId20"/>
+    <p:sldId id="294" r:id="rId18"/>
+    <p:sldId id="292" r:id="rId19"/>
+    <p:sldId id="295" r:id="rId20"/>
+    <p:sldId id="285" r:id="rId21"/>
+    <p:sldId id="261" r:id="rId22"/>
   </p:sldIdLst>
   <p:sldSz cx="12192000" cy="6858000"/>
   <p:notesSz cx="6858000" cy="9144000"/>
   <p:custDataLst>
-    <p:tags r:id="rId23"/>
+    <p:tags r:id="rId25"/>
   </p:custDataLst>
   <p:defaultTextStyle>
     <a:defPPr>
@@ -133,10 +135,10 @@
   </p:defaultTextStyle>
   <p:extLst>
     <p:ext uri="{EFAFB233-063F-42B5-8137-9DF3F51BA10A}">
-      <p15:sldGuideLst xmlns="" xmlns:p15="http://schemas.microsoft.com/office/powerpoint/2012/main"/>
+      <p15:sldGuideLst xmlns:p15="http://schemas.microsoft.com/office/powerpoint/2012/main" xmlns=""/>
     </p:ext>
     <p:ext uri="{2D200454-40CA-4A62-9FC3-DE9A4176ACB9}">
-      <p15:notesGuideLst xmlns="" xmlns:p15="http://schemas.microsoft.com/office/powerpoint/2012/main"/>
+      <p15:notesGuideLst xmlns:p15="http://schemas.microsoft.com/office/powerpoint/2012/main" xmlns=""/>
     </p:ext>
   </p:extLst>
 </p:presentation>
@@ -169,7 +171,7 @@
           <p:cNvPr id="2" name="页眉占位符 1">
             <a:extLst>
               <a:ext uri="{FF2B5EF4-FFF2-40B4-BE49-F238E27FC236}">
-                <a16:creationId xmlns="" xmlns:a16="http://schemas.microsoft.com/office/drawing/2014/main" id="{B9A56829-66AA-42AA-918E-5C6DB1AE50A7}"/>
+                <a16:creationId xmlns:a16="http://schemas.microsoft.com/office/drawing/2014/main" xmlns="" id="{B9A56829-66AA-42AA-918E-5C6DB1AE50A7}"/>
               </a:ext>
             </a:extLst>
           </p:cNvPr>
@@ -206,7 +208,7 @@
           <p:cNvPr id="3" name="日期占位符 2">
             <a:extLst>
               <a:ext uri="{FF2B5EF4-FFF2-40B4-BE49-F238E27FC236}">
-                <a16:creationId xmlns="" xmlns:a16="http://schemas.microsoft.com/office/drawing/2014/main" id="{241084A9-BC5C-4420-B17C-51E328D45576}"/>
+                <a16:creationId xmlns:a16="http://schemas.microsoft.com/office/drawing/2014/main" xmlns="" id="{241084A9-BC5C-4420-B17C-51E328D45576}"/>
               </a:ext>
             </a:extLst>
           </p:cNvPr>
@@ -236,7 +238,7 @@
           <a:p>
             <a:fld id="{B478E0E4-DC06-4041-AFA7-BB6F527FFA3F}" type="datetimeFigureOut">
               <a:rPr lang="zh-CN" altLang="en-US" smtClean="0"/>
-              <a:t>2021/6/3</a:t>
+              <a:t>2021/6/4</a:t>
             </a:fld>
             <a:endParaRPr lang="zh-CN" altLang="en-US"/>
           </a:p>
@@ -247,7 +249,7 @@
           <p:cNvPr id="4" name="页脚占位符 3">
             <a:extLst>
               <a:ext uri="{FF2B5EF4-FFF2-40B4-BE49-F238E27FC236}">
-                <a16:creationId xmlns="" xmlns:a16="http://schemas.microsoft.com/office/drawing/2014/main" id="{0D6F2124-7B35-4E59-B9E8-DB09EE1408A4}"/>
+                <a16:creationId xmlns:a16="http://schemas.microsoft.com/office/drawing/2014/main" xmlns="" id="{0D6F2124-7B35-4E59-B9E8-DB09EE1408A4}"/>
               </a:ext>
             </a:extLst>
           </p:cNvPr>
@@ -284,7 +286,7 @@
           <p:cNvPr id="5" name="灯片编号占位符 4">
             <a:extLst>
               <a:ext uri="{FF2B5EF4-FFF2-40B4-BE49-F238E27FC236}">
-                <a16:creationId xmlns="" xmlns:a16="http://schemas.microsoft.com/office/drawing/2014/main" id="{F2BF8FFE-D997-4E34-9A01-CD2014B95241}"/>
+                <a16:creationId xmlns:a16="http://schemas.microsoft.com/office/drawing/2014/main" xmlns="" id="{F2BF8FFE-D997-4E34-9A01-CD2014B95241}"/>
               </a:ext>
             </a:extLst>
           </p:cNvPr>
@@ -413,7 +415,7 @@
           <a:p>
             <a:fld id="{E86D8963-CFCD-4740-AF60-049850373CDF}" type="datetimeFigureOut">
               <a:rPr lang="zh-CN" altLang="en-US" smtClean="0"/>
-              <a:t>2021/6/3</a:t>
+              <a:t>2021/6/4</a:t>
             </a:fld>
             <a:endParaRPr lang="zh-CN" altLang="en-US"/>
           </a:p>
@@ -702,7 +704,7 @@
           <p:cNvPr id="2" name="组合 1">
             <a:extLst>
               <a:ext uri="{FF2B5EF4-FFF2-40B4-BE49-F238E27FC236}">
-                <a16:creationId xmlns="" xmlns:a14="http://schemas.microsoft.com/office/drawing/2010/main" xmlns:p14="http://schemas.microsoft.com/office/powerpoint/2010/main" xmlns:a16="http://schemas.microsoft.com/office/drawing/2014/main" id="{B17E6D21-F120-4919-9EFA-F925BD0C1809}"/>
+                <a16:creationId xmlns:a16="http://schemas.microsoft.com/office/drawing/2014/main" xmlns:p14="http://schemas.microsoft.com/office/powerpoint/2010/main" xmlns:a14="http://schemas.microsoft.com/office/drawing/2010/main" xmlns="" id="{B17E6D21-F120-4919-9EFA-F925BD0C1809}"/>
               </a:ext>
             </a:extLst>
           </p:cNvPr>
@@ -722,7 +724,7 @@
             <p:cNvPr id="16" name="Freeform 13">
               <a:extLst>
                 <a:ext uri="{FF2B5EF4-FFF2-40B4-BE49-F238E27FC236}">
-                  <a16:creationId xmlns="" xmlns:a14="http://schemas.microsoft.com/office/drawing/2010/main" xmlns:p14="http://schemas.microsoft.com/office/powerpoint/2010/main" xmlns:a16="http://schemas.microsoft.com/office/drawing/2014/main" id="{A3C2E16E-7F12-4E00-BE31-42B9F3572256}"/>
+                  <a16:creationId xmlns:a16="http://schemas.microsoft.com/office/drawing/2014/main" xmlns:p14="http://schemas.microsoft.com/office/powerpoint/2010/main" xmlns:a14="http://schemas.microsoft.com/office/drawing/2010/main" xmlns="" id="{A3C2E16E-7F12-4E00-BE31-42B9F3572256}"/>
                 </a:ext>
               </a:extLst>
             </p:cNvPr>
@@ -846,7 +848,7 @@
             <p:cNvPr id="21" name="Freeform 13">
               <a:extLst>
                 <a:ext uri="{FF2B5EF4-FFF2-40B4-BE49-F238E27FC236}">
-                  <a16:creationId xmlns="" xmlns:a14="http://schemas.microsoft.com/office/drawing/2010/main" xmlns:p14="http://schemas.microsoft.com/office/powerpoint/2010/main" xmlns:a16="http://schemas.microsoft.com/office/drawing/2014/main" id="{51488BE8-69EC-4A9A-8369-E63E8941B4D1}"/>
+                  <a16:creationId xmlns:a16="http://schemas.microsoft.com/office/drawing/2014/main" xmlns:p14="http://schemas.microsoft.com/office/powerpoint/2010/main" xmlns:a14="http://schemas.microsoft.com/office/drawing/2010/main" xmlns="" id="{51488BE8-69EC-4A9A-8369-E63E8941B4D1}"/>
                 </a:ext>
               </a:extLst>
             </p:cNvPr>
@@ -957,7 +959,7 @@
             <p:cNvPr id="23" name="Freeform 17">
               <a:extLst>
                 <a:ext uri="{FF2B5EF4-FFF2-40B4-BE49-F238E27FC236}">
-                  <a16:creationId xmlns="" xmlns:a14="http://schemas.microsoft.com/office/drawing/2010/main" xmlns:p14="http://schemas.microsoft.com/office/powerpoint/2010/main" xmlns:a16="http://schemas.microsoft.com/office/drawing/2014/main" id="{52B0F295-D75B-467D-B253-DA283681346B}"/>
+                  <a16:creationId xmlns:a16="http://schemas.microsoft.com/office/drawing/2014/main" xmlns:p14="http://schemas.microsoft.com/office/powerpoint/2010/main" xmlns:a14="http://schemas.microsoft.com/office/drawing/2010/main" xmlns="" id="{52B0F295-D75B-467D-B253-DA283681346B}"/>
                 </a:ext>
               </a:extLst>
             </p:cNvPr>
@@ -1295,7 +1297,7 @@
           <p:cNvPr id="4" name="Freeform 13">
             <a:extLst>
               <a:ext uri="{FF2B5EF4-FFF2-40B4-BE49-F238E27FC236}">
-                <a16:creationId xmlns="" xmlns:p14="http://schemas.microsoft.com/office/powerpoint/2010/main" xmlns:a16="http://schemas.microsoft.com/office/drawing/2014/main" id="{6E0A0000-C9EC-41F9-9457-6F2EC527F0AC}"/>
+                <a16:creationId xmlns:a16="http://schemas.microsoft.com/office/drawing/2014/main" xmlns:p14="http://schemas.microsoft.com/office/powerpoint/2010/main" xmlns="" id="{6E0A0000-C9EC-41F9-9457-6F2EC527F0AC}"/>
               </a:ext>
             </a:extLst>
           </p:cNvPr>
@@ -1599,7 +1601,7 @@
           <p:cNvPr id="3" name="日期占位符 2">
             <a:extLst>
               <a:ext uri="{FF2B5EF4-FFF2-40B4-BE49-F238E27FC236}">
-                <a16:creationId xmlns="" xmlns:p14="http://schemas.microsoft.com/office/powerpoint/2010/main" xmlns:a16="http://schemas.microsoft.com/office/drawing/2014/main" id="{9888B6D7-9D3F-49D7-BACE-73A9D1149A74}"/>
+                <a16:creationId xmlns:a16="http://schemas.microsoft.com/office/drawing/2014/main" xmlns:p14="http://schemas.microsoft.com/office/powerpoint/2010/main" xmlns="" id="{9888B6D7-9D3F-49D7-BACE-73A9D1149A74}"/>
               </a:ext>
             </a:extLst>
           </p:cNvPr>
@@ -1624,7 +1626,7 @@
           <p:cNvPr id="4" name="页脚占位符 3">
             <a:extLst>
               <a:ext uri="{FF2B5EF4-FFF2-40B4-BE49-F238E27FC236}">
-                <a16:creationId xmlns="" xmlns:p14="http://schemas.microsoft.com/office/powerpoint/2010/main" xmlns:a16="http://schemas.microsoft.com/office/drawing/2014/main" id="{7AC997A4-1DD8-4731-B9FD-42398A20FF85}"/>
+                <a16:creationId xmlns:a16="http://schemas.microsoft.com/office/drawing/2014/main" xmlns:p14="http://schemas.microsoft.com/office/powerpoint/2010/main" xmlns="" id="{7AC997A4-1DD8-4731-B9FD-42398A20FF85}"/>
               </a:ext>
             </a:extLst>
           </p:cNvPr>
@@ -1661,7 +1663,7 @@
           <p:cNvPr id="5" name="灯片编号占位符 4">
             <a:extLst>
               <a:ext uri="{FF2B5EF4-FFF2-40B4-BE49-F238E27FC236}">
-                <a16:creationId xmlns="" xmlns:p14="http://schemas.microsoft.com/office/powerpoint/2010/main" xmlns:a16="http://schemas.microsoft.com/office/drawing/2014/main" id="{DBA9825E-1876-42AD-ABCF-E0E100F351CA}"/>
+                <a16:creationId xmlns:a16="http://schemas.microsoft.com/office/drawing/2014/main" xmlns:p14="http://schemas.microsoft.com/office/powerpoint/2010/main" xmlns="" id="{DBA9825E-1876-42AD-ABCF-E0E100F351CA}"/>
               </a:ext>
             </a:extLst>
           </p:cNvPr>
@@ -1691,7 +1693,7 @@
           <p:cNvPr id="6" name="标题 5">
             <a:extLst>
               <a:ext uri="{FF2B5EF4-FFF2-40B4-BE49-F238E27FC236}">
-                <a16:creationId xmlns="" xmlns:p14="http://schemas.microsoft.com/office/powerpoint/2010/main" xmlns:a16="http://schemas.microsoft.com/office/drawing/2014/main" id="{D124F9DB-C87A-423F-9657-38C7A2901430}"/>
+                <a16:creationId xmlns:a16="http://schemas.microsoft.com/office/drawing/2014/main" xmlns:p14="http://schemas.microsoft.com/office/powerpoint/2010/main" xmlns="" id="{D124F9DB-C87A-423F-9657-38C7A2901430}"/>
               </a:ext>
             </a:extLst>
           </p:cNvPr>
@@ -1724,7 +1726,7 @@
           <p:cNvPr id="8" name="内容占位符 7">
             <a:extLst>
               <a:ext uri="{FF2B5EF4-FFF2-40B4-BE49-F238E27FC236}">
-                <a16:creationId xmlns="" xmlns:p14="http://schemas.microsoft.com/office/powerpoint/2010/main" xmlns:a16="http://schemas.microsoft.com/office/drawing/2014/main" id="{2070191C-4093-409C-8FD5-7369A79637AD}"/>
+                <a16:creationId xmlns:a16="http://schemas.microsoft.com/office/drawing/2014/main" xmlns:p14="http://schemas.microsoft.com/office/powerpoint/2010/main" xmlns="" id="{2070191C-4093-409C-8FD5-7369A79637AD}"/>
               </a:ext>
             </a:extLst>
           </p:cNvPr>
@@ -1833,7 +1835,7 @@
           <p:cNvPr id="2" name="Title 1">
             <a:extLst>
               <a:ext uri="{FF2B5EF4-FFF2-40B4-BE49-F238E27FC236}">
-                <a16:creationId xmlns="" xmlns:a16="http://schemas.microsoft.com/office/drawing/2014/main" id="{F21C7A1C-3684-4AAF-A408-C63B6CB64104}"/>
+                <a16:creationId xmlns:a16="http://schemas.microsoft.com/office/drawing/2014/main" xmlns="" id="{F21C7A1C-3684-4AAF-A408-C63B6CB64104}"/>
               </a:ext>
             </a:extLst>
           </p:cNvPr>
@@ -1866,7 +1868,7 @@
           <p:cNvPr id="3" name="Date Placeholder 2">
             <a:extLst>
               <a:ext uri="{FF2B5EF4-FFF2-40B4-BE49-F238E27FC236}">
-                <a16:creationId xmlns="" xmlns:a16="http://schemas.microsoft.com/office/drawing/2014/main" id="{8986EA5F-D77D-4318-90E9-C04AA8ADC0D1}"/>
+                <a16:creationId xmlns:a16="http://schemas.microsoft.com/office/drawing/2014/main" xmlns="" id="{8986EA5F-D77D-4318-90E9-C04AA8ADC0D1}"/>
               </a:ext>
             </a:extLst>
           </p:cNvPr>
@@ -1891,7 +1893,7 @@
           <p:cNvPr id="4" name="Footer Placeholder 3">
             <a:extLst>
               <a:ext uri="{FF2B5EF4-FFF2-40B4-BE49-F238E27FC236}">
-                <a16:creationId xmlns="" xmlns:a16="http://schemas.microsoft.com/office/drawing/2014/main" id="{00832621-D9D9-445E-BFF9-F8348FA1E262}"/>
+                <a16:creationId xmlns:a16="http://schemas.microsoft.com/office/drawing/2014/main" xmlns="" id="{00832621-D9D9-445E-BFF9-F8348FA1E262}"/>
               </a:ext>
             </a:extLst>
           </p:cNvPr>
@@ -1928,7 +1930,7 @@
           <p:cNvPr id="5" name="Slide Number Placeholder 4">
             <a:extLst>
               <a:ext uri="{FF2B5EF4-FFF2-40B4-BE49-F238E27FC236}">
-                <a16:creationId xmlns="" xmlns:a16="http://schemas.microsoft.com/office/drawing/2014/main" id="{8371151B-F790-4A9F-962F-B8718A9560A9}"/>
+                <a16:creationId xmlns:a16="http://schemas.microsoft.com/office/drawing/2014/main" xmlns="" id="{8371151B-F790-4A9F-962F-B8718A9560A9}"/>
               </a:ext>
             </a:extLst>
           </p:cNvPr>
@@ -2018,7 +2020,7 @@
           <p:cNvPr id="5" name="组合 4">
             <a:extLst>
               <a:ext uri="{FF2B5EF4-FFF2-40B4-BE49-F238E27FC236}">
-                <a16:creationId xmlns="" xmlns:a14="http://schemas.microsoft.com/office/drawing/2010/main" xmlns:p14="http://schemas.microsoft.com/office/powerpoint/2010/main" xmlns:a16="http://schemas.microsoft.com/office/drawing/2014/main" id="{99391505-0ED0-4506-936F-52505EF1686C}"/>
+                <a16:creationId xmlns:a16="http://schemas.microsoft.com/office/drawing/2014/main" xmlns:p14="http://schemas.microsoft.com/office/powerpoint/2010/main" xmlns:a14="http://schemas.microsoft.com/office/drawing/2010/main" xmlns="" id="{99391505-0ED0-4506-936F-52505EF1686C}"/>
               </a:ext>
             </a:extLst>
           </p:cNvPr>
@@ -2038,7 +2040,7 @@
             <p:cNvPr id="7" name="Freeform 13">
               <a:extLst>
                 <a:ext uri="{FF2B5EF4-FFF2-40B4-BE49-F238E27FC236}">
-                  <a16:creationId xmlns="" xmlns:a14="http://schemas.microsoft.com/office/drawing/2010/main" xmlns:p14="http://schemas.microsoft.com/office/powerpoint/2010/main" xmlns:a16="http://schemas.microsoft.com/office/drawing/2014/main" id="{FC465888-34E2-4A7E-80D2-92BBD9280BD9}"/>
+                  <a16:creationId xmlns:a16="http://schemas.microsoft.com/office/drawing/2014/main" xmlns:p14="http://schemas.microsoft.com/office/powerpoint/2010/main" xmlns:a14="http://schemas.microsoft.com/office/drawing/2010/main" xmlns="" id="{FC465888-34E2-4A7E-80D2-92BBD9280BD9}"/>
                 </a:ext>
               </a:extLst>
             </p:cNvPr>
@@ -2162,7 +2164,7 @@
             <p:cNvPr id="8" name="Freeform 13">
               <a:extLst>
                 <a:ext uri="{FF2B5EF4-FFF2-40B4-BE49-F238E27FC236}">
-                  <a16:creationId xmlns="" xmlns:a14="http://schemas.microsoft.com/office/drawing/2010/main" xmlns:p14="http://schemas.microsoft.com/office/powerpoint/2010/main" xmlns:a16="http://schemas.microsoft.com/office/drawing/2014/main" id="{549CC44A-F314-499E-846A-FB8F04ED3E0C}"/>
+                  <a16:creationId xmlns:a16="http://schemas.microsoft.com/office/drawing/2014/main" xmlns:p14="http://schemas.microsoft.com/office/powerpoint/2010/main" xmlns:a14="http://schemas.microsoft.com/office/drawing/2010/main" xmlns="" id="{549CC44A-F314-499E-846A-FB8F04ED3E0C}"/>
                 </a:ext>
               </a:extLst>
             </p:cNvPr>
@@ -2273,7 +2275,7 @@
             <p:cNvPr id="9" name="Freeform 17">
               <a:extLst>
                 <a:ext uri="{FF2B5EF4-FFF2-40B4-BE49-F238E27FC236}">
-                  <a16:creationId xmlns="" xmlns:a14="http://schemas.microsoft.com/office/drawing/2010/main" xmlns:p14="http://schemas.microsoft.com/office/powerpoint/2010/main" xmlns:a16="http://schemas.microsoft.com/office/drawing/2014/main" id="{9FC0C4B5-6A75-4A11-962E-91FE2C70F846}"/>
+                  <a16:creationId xmlns:a16="http://schemas.microsoft.com/office/drawing/2014/main" xmlns:p14="http://schemas.microsoft.com/office/powerpoint/2010/main" xmlns:a14="http://schemas.microsoft.com/office/drawing/2010/main" xmlns="" id="{9FC0C4B5-6A75-4A11-962E-91FE2C70F846}"/>
                 </a:ext>
               </a:extLst>
             </p:cNvPr>
@@ -2460,7 +2462,7 @@
           <p:cNvPr id="6" name="文本占位符 13">
             <a:extLst>
               <a:ext uri="{FF2B5EF4-FFF2-40B4-BE49-F238E27FC236}">
-                <a16:creationId xmlns="" xmlns:a14="http://schemas.microsoft.com/office/drawing/2010/main" xmlns:p14="http://schemas.microsoft.com/office/powerpoint/2010/main" xmlns:a16="http://schemas.microsoft.com/office/drawing/2014/main" id="{05EBDA4F-7210-4CAE-8333-80DB24212E78}"/>
+                <a16:creationId xmlns:a16="http://schemas.microsoft.com/office/drawing/2014/main" xmlns:p14="http://schemas.microsoft.com/office/powerpoint/2010/main" xmlns:a14="http://schemas.microsoft.com/office/drawing/2010/main" xmlns="" id="{05EBDA4F-7210-4CAE-8333-80DB24212E78}"/>
               </a:ext>
             </a:extLst>
           </p:cNvPr>
@@ -2692,7 +2694,7 @@
           <p:cNvPr id="8" name="日期占位符 3">
             <a:extLst>
               <a:ext uri="{FF2B5EF4-FFF2-40B4-BE49-F238E27FC236}">
-                <a16:creationId xmlns="" xmlns:p14="http://schemas.microsoft.com/office/powerpoint/2010/main" xmlns:p15="http://schemas.microsoft.com/office/powerpoint/2012/main" xmlns:a16="http://schemas.microsoft.com/office/drawing/2014/main" id="{04388434-9949-479C-A9C3-67A953F6A939}"/>
+                <a16:creationId xmlns:a16="http://schemas.microsoft.com/office/drawing/2014/main" xmlns:p15="http://schemas.microsoft.com/office/powerpoint/2012/main" xmlns:p14="http://schemas.microsoft.com/office/powerpoint/2010/main" xmlns="" id="{04388434-9949-479C-A9C3-67A953F6A939}"/>
               </a:ext>
             </a:extLst>
           </p:cNvPr>
@@ -2736,7 +2738,7 @@
           <p:cNvPr id="9" name="页脚占位符 4">
             <a:extLst>
               <a:ext uri="{FF2B5EF4-FFF2-40B4-BE49-F238E27FC236}">
-                <a16:creationId xmlns="" xmlns:p14="http://schemas.microsoft.com/office/powerpoint/2010/main" xmlns:p15="http://schemas.microsoft.com/office/powerpoint/2012/main" xmlns:a16="http://schemas.microsoft.com/office/drawing/2014/main" id="{50A5656E-7A33-4865-A262-1F96263BAA16}"/>
+                <a16:creationId xmlns:a16="http://schemas.microsoft.com/office/drawing/2014/main" xmlns:p15="http://schemas.microsoft.com/office/powerpoint/2012/main" xmlns:p14="http://schemas.microsoft.com/office/powerpoint/2010/main" xmlns="" id="{50A5656E-7A33-4865-A262-1F96263BAA16}"/>
               </a:ext>
             </a:extLst>
           </p:cNvPr>
@@ -2792,7 +2794,7 @@
           <p:cNvPr id="10" name="灯片编号占位符 5">
             <a:extLst>
               <a:ext uri="{FF2B5EF4-FFF2-40B4-BE49-F238E27FC236}">
-                <a16:creationId xmlns="" xmlns:p14="http://schemas.microsoft.com/office/powerpoint/2010/main" xmlns:p15="http://schemas.microsoft.com/office/powerpoint/2012/main" xmlns:a16="http://schemas.microsoft.com/office/drawing/2014/main" id="{5BF52F79-380E-4278-8B67-588AFE5840F9}"/>
+                <a16:creationId xmlns:a16="http://schemas.microsoft.com/office/drawing/2014/main" xmlns:p15="http://schemas.microsoft.com/office/powerpoint/2012/main" xmlns:p14="http://schemas.microsoft.com/office/powerpoint/2010/main" xmlns="" id="{5BF52F79-380E-4278-8B67-588AFE5840F9}"/>
               </a:ext>
             </a:extLst>
           </p:cNvPr>
@@ -3135,7 +3137,7 @@
   </p:txStyles>
   <p:extLst mod="1">
     <p:ext uri="{27BBF7A9-308A-43DC-89C8-2F10F3537804}">
-      <p15:sldGuideLst xmlns="" xmlns:a16="http://schemas.microsoft.com/office/drawing/2014/main" xmlns:p14="http://schemas.microsoft.com/office/powerpoint/2010/main" xmlns:p15="http://schemas.microsoft.com/office/powerpoint/2012/main">
+      <p15:sldGuideLst xmlns:p15="http://schemas.microsoft.com/office/powerpoint/2012/main" xmlns:p14="http://schemas.microsoft.com/office/powerpoint/2010/main" xmlns:a16="http://schemas.microsoft.com/office/drawing/2014/main" xmlns="">
         <p15:guide id="1" pos="422" userDrawn="1">
           <p15:clr>
             <a:srgbClr val="F26B43"/>
@@ -3194,7 +3196,7 @@
           <p:cNvPr id="3" name="对象 2" hidden="1">
             <a:extLst>
               <a:ext uri="{FF2B5EF4-FFF2-40B4-BE49-F238E27FC236}">
-                <a16:creationId xmlns="" xmlns:p14="http://schemas.microsoft.com/office/powerpoint/2010/main" xmlns:mc="http://schemas.openxmlformats.org/markup-compatibility/2006" xmlns:v="urn:schemas-microsoft-com:vml" xmlns:a16="http://schemas.microsoft.com/office/drawing/2014/main" id="{3C326D0B-7DAB-41B6-8030-2E4A18CC949B}"/>
+                <a16:creationId xmlns:a16="http://schemas.microsoft.com/office/drawing/2014/main" xmlns:v="urn:schemas-microsoft-com:vml" xmlns:mc="http://schemas.openxmlformats.org/markup-compatibility/2006" xmlns:p14="http://schemas.microsoft.com/office/powerpoint/2010/main" xmlns="" id="{3C326D0B-7DAB-41B6-8030-2E4A18CC949B}"/>
               </a:ext>
             </a:extLst>
           </p:cNvPr>
@@ -3217,7 +3219,7 @@
           <a:graphicData uri="http://schemas.openxmlformats.org/presentationml/2006/ole">
             <mc:AlternateContent xmlns:mc="http://schemas.openxmlformats.org/markup-compatibility/2006">
               <mc:Choice xmlns:v="urn:schemas-microsoft-com:vml" Requires="v">
-                <p:oleObj spid="_x0000_s1119" name="think-cell Slide" r:id="rId5" imgW="347" imgH="348" progId="TCLayout.ActiveDocument.1">
+                <p:oleObj spid="_x0000_s1141" name="think-cell Slide" r:id="rId5" imgW="347" imgH="348" progId="TCLayout.ActiveDocument.1">
                   <p:embed/>
                 </p:oleObj>
               </mc:Choice>
@@ -3229,7 +3231,7 @@
                       <p:cNvPr id="3" name="对象 2" hidden="1">
                         <a:extLst>
                           <a:ext uri="{FF2B5EF4-FFF2-40B4-BE49-F238E27FC236}">
-                            <a16:creationId xmlns="" xmlns:p14="http://schemas.microsoft.com/office/powerpoint/2010/main" xmlns:v="urn:schemas-microsoft-com:vml" xmlns:a16="http://schemas.microsoft.com/office/drawing/2014/main" id="{3C326D0B-7DAB-41B6-8030-2E4A18CC949B}"/>
+                            <a16:creationId xmlns:a16="http://schemas.microsoft.com/office/drawing/2014/main" xmlns:v="urn:schemas-microsoft-com:vml" xmlns:p14="http://schemas.microsoft.com/office/powerpoint/2010/main" xmlns="" id="{3C326D0B-7DAB-41B6-8030-2E4A18CC949B}"/>
                           </a:ext>
                         </a:extLst>
                       </p:cNvPr>
@@ -3263,7 +3265,7 @@
           <p:cNvPr id="2" name="矩形 1" hidden="1">
             <a:extLst>
               <a:ext uri="{FF2B5EF4-FFF2-40B4-BE49-F238E27FC236}">
-                <a16:creationId xmlns="" xmlns:p14="http://schemas.microsoft.com/office/powerpoint/2010/main" xmlns:mc="http://schemas.openxmlformats.org/markup-compatibility/2006" xmlns:v="urn:schemas-microsoft-com:vml" xmlns:a16="http://schemas.microsoft.com/office/drawing/2014/main" id="{EC933494-1B63-4A32-964F-D05236799BAA}"/>
+                <a16:creationId xmlns:a16="http://schemas.microsoft.com/office/drawing/2014/main" xmlns:v="urn:schemas-microsoft-com:vml" xmlns:mc="http://schemas.openxmlformats.org/markup-compatibility/2006" xmlns:p14="http://schemas.microsoft.com/office/powerpoint/2010/main" xmlns="" id="{EC933494-1B63-4A32-964F-D05236799BAA}"/>
               </a:ext>
             </a:extLst>
           </p:cNvPr>
@@ -3527,7 +3529,7 @@
           <p:cNvPr id="9" name="文本框 8">
             <a:extLst>
               <a:ext uri="{FF2B5EF4-FFF2-40B4-BE49-F238E27FC236}">
-                <a16:creationId xmlns="" xmlns:p14="http://schemas.microsoft.com/office/powerpoint/2010/main" xmlns:a16="http://schemas.microsoft.com/office/drawing/2014/main" id="{04F69230-F3A6-4586-9371-A858F4763E9F}"/>
+                <a16:creationId xmlns:a16="http://schemas.microsoft.com/office/drawing/2014/main" xmlns:p14="http://schemas.microsoft.com/office/powerpoint/2010/main" xmlns="" id="{04F69230-F3A6-4586-9371-A858F4763E9F}"/>
               </a:ext>
             </a:extLst>
           </p:cNvPr>
@@ -3932,6 +3934,13 @@
   <p:clrMapOvr>
     <a:masterClrMapping/>
   </p:clrMapOvr>
+  <p:timing>
+    <p:tnLst>
+      <p:par>
+        <p:cTn id="1" dur="indefinite" restart="never" nodeType="tmRoot"/>
+      </p:par>
+    </p:tnLst>
+  </p:timing>
 </p:sld>
 </file>
 
@@ -4024,7 +4033,11 @@
           <a:p>
             <a:r>
               <a:rPr lang="en-US" altLang="zh-TW" dirty="0" smtClean="0"/>
-              <a:t>Spring boot – Auto configure</a:t>
+              <a:t>3. Spring </a:t>
+            </a:r>
+            <a:r>
+              <a:rPr lang="en-US" altLang="zh-TW" dirty="0" smtClean="0"/>
+              <a:t>boot – Auto configure</a:t>
             </a:r>
             <a:endParaRPr lang="zh-TW" altLang="en-US" dirty="0"/>
           </a:p>
@@ -4255,6 +4268,13 @@
   <p:clrMapOvr>
     <a:masterClrMapping/>
   </p:clrMapOvr>
+  <p:timing>
+    <p:tnLst>
+      <p:par>
+        <p:cTn id="1" dur="indefinite" restart="never" nodeType="tmRoot"/>
+      </p:par>
+    </p:tnLst>
+  </p:timing>
 </p:sld>
 </file>
 
@@ -4351,7 +4371,11 @@
             </a:r>
             <a:r>
               <a:rPr lang="en-US" altLang="zh-TW" dirty="0" smtClean="0"/>
-              <a:t>.Spring boot –</a:t>
+              <a:t>. Spring </a:t>
+            </a:r>
+            <a:r>
+              <a:rPr lang="en-US" altLang="zh-TW" dirty="0" smtClean="0"/>
+              <a:t>boot –</a:t>
             </a:r>
             <a:r>
               <a:rPr lang="zh-TW" altLang="en-US" dirty="0" smtClean="0"/>
@@ -4630,7 +4654,11 @@
             </a:r>
             <a:r>
               <a:rPr lang="en-US" altLang="zh-TW" dirty="0" smtClean="0"/>
-              <a:t>.Spring boot –</a:t>
+              <a:t>. Spring </a:t>
+            </a:r>
+            <a:r>
+              <a:rPr lang="en-US" altLang="zh-TW" dirty="0" smtClean="0"/>
+              <a:t>boot –</a:t>
             </a:r>
             <a:r>
               <a:rPr lang="zh-TW" altLang="en-US" dirty="0" smtClean="0"/>
@@ -4897,7 +4925,6 @@
               <a:rPr lang="zh-CN" altLang="en-US" sz="2000" b="1" dirty="0" smtClean="0"/>
               <a:t>資源即可。</a:t>
             </a:r>
-            <a:endParaRPr lang="zh-CN" altLang="en-US" sz="2000" b="1" dirty="0" smtClean="0"/>
           </a:p>
         </p:txBody>
       </p:sp>
@@ -5014,7 +5041,11 @@
             </a:r>
             <a:r>
               <a:rPr lang="en-US" altLang="zh-TW" dirty="0" smtClean="0"/>
-              <a:t>.Spring boot –</a:t>
+              <a:t>. Spring </a:t>
+            </a:r>
+            <a:r>
+              <a:rPr lang="en-US" altLang="zh-TW" dirty="0" smtClean="0"/>
+              <a:t>boot –</a:t>
             </a:r>
             <a:r>
               <a:rPr lang="zh-TW" altLang="en-US" dirty="0" smtClean="0"/>
@@ -5230,8 +5261,16 @@
           <a:lstStyle/>
           <a:p>
             <a:r>
-              <a:rPr lang="en-US" altLang="zh-TW" dirty="0" smtClean="0"/>
-              <a:t>4. Spring boot – </a:t>
+              <a:rPr lang="en-US" altLang="zh-TW" dirty="0"/>
+              <a:t>3</a:t>
+            </a:r>
+            <a:r>
+              <a:rPr lang="en-US" altLang="zh-TW" dirty="0" smtClean="0"/>
+              <a:t>. </a:t>
+            </a:r>
+            <a:r>
+              <a:rPr lang="en-US" altLang="zh-TW" dirty="0" smtClean="0"/>
+              <a:t>Spring boot – </a:t>
             </a:r>
             <a:r>
               <a:rPr lang="en-US" altLang="zh-TW" dirty="0" err="1" smtClean="0"/>
@@ -5637,62 +5676,7 @@
       </p:grpSpPr>
       <p:sp>
         <p:nvSpPr>
-          <p:cNvPr id="2" name="頁尾版面配置區 1"/>
-          <p:cNvSpPr>
-            <a:spLocks noGrp="1"/>
-          </p:cNvSpPr>
-          <p:nvPr>
-            <p:ph type="ftr" sz="quarter" idx="11"/>
-          </p:nvPr>
-        </p:nvSpPr>
-        <p:spPr/>
-        <p:txBody>
-          <a:bodyPr/>
-          <a:lstStyle/>
-          <a:p>
-            <a:r>
-              <a:rPr lang="zh-CN" altLang="en-US" smtClean="0"/>
-              <a:t>请在插入菜单</a:t>
-            </a:r>
-            <a:r>
-              <a:rPr lang="en-US" altLang="zh-CN" smtClean="0"/>
-              <a:t>—</a:t>
-            </a:r>
-            <a:r>
-              <a:rPr lang="zh-CN" altLang="en-US" smtClean="0"/>
-              <a:t>页眉和页脚中修改此文本</a:t>
-            </a:r>
-            <a:endParaRPr lang="zh-CN" altLang="en-US" dirty="0"/>
-          </a:p>
-        </p:txBody>
-      </p:sp>
-      <p:sp>
-        <p:nvSpPr>
-          <p:cNvPr id="3" name="投影片編號版面配置區 2"/>
-          <p:cNvSpPr>
-            <a:spLocks noGrp="1"/>
-          </p:cNvSpPr>
-          <p:nvPr>
-            <p:ph type="sldNum" sz="quarter" idx="12"/>
-          </p:nvPr>
-        </p:nvSpPr>
-        <p:spPr/>
-        <p:txBody>
-          <a:bodyPr/>
-          <a:lstStyle/>
-          <a:p>
-            <a:fld id="{5DD3DB80-B894-403A-B48E-6FDC1A72010E}" type="slidenum">
-              <a:rPr lang="zh-CN" altLang="en-US" smtClean="0"/>
-              <a:pPr/>
-              <a:t>17</a:t>
-            </a:fld>
-            <a:endParaRPr lang="zh-CN" altLang="en-US"/>
-          </a:p>
-        </p:txBody>
-      </p:sp>
-      <p:sp>
-        <p:nvSpPr>
-          <p:cNvPr id="4" name="標題 3"/>
+          <p:cNvPr id="5" name="标题 4"/>
           <p:cNvSpPr>
             <a:spLocks noGrp="1"/>
           </p:cNvSpPr>
@@ -5705,18 +5689,22 @@
           <a:bodyPr/>
           <a:lstStyle/>
           <a:p>
-            <a:endParaRPr lang="zh-TW" altLang="en-US"/>
+            <a:r>
+              <a:rPr lang="en-US" altLang="zh-CN" dirty="0" smtClean="0"/>
+              <a:t>Spring Cloud Introduce</a:t>
+            </a:r>
+            <a:endParaRPr lang="zh-CN" altLang="en-US" dirty="0"/>
           </a:p>
         </p:txBody>
       </p:sp>
       <p:sp>
         <p:nvSpPr>
-          <p:cNvPr id="5" name="內容版面配置區 4"/>
+          <p:cNvPr id="6" name="文本占位符 5"/>
           <p:cNvSpPr>
             <a:spLocks noGrp="1"/>
           </p:cNvSpPr>
           <p:nvPr>
-            <p:ph sz="quarter" idx="13"/>
+            <p:ph type="body" idx="1"/>
           </p:nvPr>
         </p:nvSpPr>
         <p:spPr/>
@@ -5724,20 +5712,112 @@
           <a:bodyPr/>
           <a:lstStyle/>
           <a:p>
-            <a:endParaRPr lang="zh-TW" altLang="en-US"/>
+            <a:pPr lvl="0"/>
+            <a:r>
+              <a:rPr lang="en-US" altLang="zh-CN" dirty="0" smtClean="0"/>
+              <a:t>What is it ?</a:t>
+            </a:r>
+          </a:p>
+          <a:p>
+            <a:pPr lvl="0"/>
+            <a:endParaRPr lang="zh-CN" altLang="en-US" dirty="0"/>
+          </a:p>
+        </p:txBody>
+      </p:sp>
+      <p:sp>
+        <p:nvSpPr>
+          <p:cNvPr id="9" name="文本框 8">
+            <a:extLst>
+              <a:ext uri="{FF2B5EF4-FFF2-40B4-BE49-F238E27FC236}">
+                <a16:creationId xmlns:a16="http://schemas.microsoft.com/office/drawing/2014/main" xmlns:p14="http://schemas.microsoft.com/office/powerpoint/2010/main" xmlns="" id="{04F69230-F3A6-4586-9371-A858F4763E9F}"/>
+              </a:ext>
+            </a:extLst>
+          </p:cNvPr>
+          <p:cNvSpPr txBox="1"/>
+          <p:nvPr/>
+        </p:nvSpPr>
+        <p:spPr>
+          <a:xfrm>
+            <a:off x="2636995" y="2984045"/>
+            <a:ext cx="1023516" cy="889909"/>
+          </a:xfrm>
+          <a:prstGeom prst="rect">
+            <a:avLst/>
+          </a:prstGeom>
+          <a:noFill/>
+          <a:ln w="117475">
+            <a:noFill/>
+          </a:ln>
+        </p:spPr>
+        <p:txBody>
+          <a:bodyPr wrap="none" rtlCol="0">
+            <a:prstTxWarp prst="textPlain">
+              <a:avLst/>
+            </a:prstTxWarp>
+            <a:spAutoFit/>
+          </a:bodyPr>
+          <a:lstStyle/>
+          <a:p>
+            <a:r>
+              <a:rPr lang="en-US" altLang="zh-CN" spc="100" dirty="0" smtClean="0">
+                <a:solidFill>
+                  <a:schemeClr val="bg1"/>
+                </a:solidFill>
+                <a:latin typeface="Impact" panose="020B0806030902050204" pitchFamily="34" charset="0"/>
+                <a:cs typeface="Arial" panose="020B0604020202020204" pitchFamily="34" charset="0"/>
+              </a:rPr>
+              <a:t>/</a:t>
+            </a:r>
+            <a:r>
+              <a:rPr lang="en-US" altLang="zh-CN" sz="100" spc="100" dirty="0" smtClean="0">
+                <a:solidFill>
+                  <a:schemeClr val="bg1"/>
+                </a:solidFill>
+                <a:latin typeface="Impact" panose="020B0806030902050204" pitchFamily="34" charset="0"/>
+                <a:cs typeface="Arial" panose="020B0604020202020204" pitchFamily="34" charset="0"/>
+              </a:rPr>
+              <a:t> </a:t>
+            </a:r>
+            <a:r>
+              <a:rPr lang="en-US" altLang="zh-CN" spc="100" dirty="0" smtClean="0">
+                <a:solidFill>
+                  <a:schemeClr val="bg1"/>
+                </a:solidFill>
+                <a:latin typeface="Impact" panose="020B0806030902050204" pitchFamily="34" charset="0"/>
+                <a:cs typeface="Arial" panose="020B0604020202020204" pitchFamily="34" charset="0"/>
+              </a:rPr>
+              <a:t>04</a:t>
+            </a:r>
+            <a:endParaRPr lang="zh-CN" altLang="en-US" spc="100" dirty="0">
+              <a:solidFill>
+                <a:schemeClr val="bg1"/>
+              </a:solidFill>
+              <a:latin typeface="Impact" panose="020B0806030902050204" pitchFamily="34" charset="0"/>
+              <a:cs typeface="Arial" panose="020B0604020202020204" pitchFamily="34" charset="0"/>
+            </a:endParaRPr>
           </a:p>
         </p:txBody>
       </p:sp>
     </p:spTree>
+    <p:custDataLst>
+      <p:tags r:id="rId2"/>
+    </p:custDataLst>
     <p:extLst>
       <p:ext uri="{BB962C8B-B14F-4D97-AF65-F5344CB8AC3E}">
-        <p14:creationId xmlns:p14="http://schemas.microsoft.com/office/powerpoint/2010/main" val="2624643691"/>
+        <p14:creationId xmlns:p14="http://schemas.microsoft.com/office/powerpoint/2010/main" val="199141377"/>
       </p:ext>
     </p:extLst>
   </p:cSld>
   <p:clrMapOvr>
     <a:masterClrMapping/>
   </p:clrMapOvr>
+  <p:timing>
+    <p:tnLst>
+      <p:par>
+        <p:cTn id="1" dur="indefinite" restart="never" nodeType="tmRoot"/>
+      </p:par>
+    </p:tnLst>
+  </p:timing>
 </p:sld>
 </file>
 
@@ -5829,9 +5909,10 @@
           <a:lstStyle/>
           <a:p>
             <a:r>
-              <a:rPr lang="zh-TW" altLang="en-US" dirty="0"/>
-              <a:t>總結</a:t>
-            </a:r>
+              <a:rPr lang="en-US" altLang="zh-TW" dirty="0" smtClean="0"/>
+              <a:t>Spring Cloud Introduce</a:t>
+            </a:r>
+            <a:endParaRPr lang="zh-TW" altLang="en-US" dirty="0"/>
           </a:p>
         </p:txBody>
       </p:sp>
@@ -5847,29 +5928,175 @@
         </p:nvSpPr>
         <p:spPr/>
         <p:txBody>
-          <a:bodyPr/>
+          <a:bodyPr>
+            <a:normAutofit lnSpcReduction="10000"/>
+          </a:bodyPr>
           <a:lstStyle/>
           <a:p>
-            <a:pPr marL="0" indent="0">
-              <a:buNone/>
-            </a:pPr>
+            <a:r>
+              <a:rPr lang="en-US" altLang="zh-TW" sz="2000" dirty="0" smtClean="0"/>
+              <a:t>A function library set for cloud </a:t>
+            </a:r>
+            <a:r>
+              <a:rPr lang="en-US" altLang="zh-TW" sz="2000" dirty="0"/>
+              <a:t>a</a:t>
+            </a:r>
+            <a:r>
+              <a:rPr lang="en-US" altLang="zh-TW" sz="2000" dirty="0" smtClean="0"/>
+              <a:t>pplication.</a:t>
+            </a:r>
+          </a:p>
+          <a:p>
+            <a:r>
+              <a:rPr lang="zh-TW" altLang="en-US" dirty="0"/>
+              <a:t>下面列出</a:t>
+            </a:r>
+            <a:r>
+              <a:rPr lang="zh-TW" altLang="en-US" dirty="0" smtClean="0"/>
+              <a:t>一些常用的基本套件</a:t>
+            </a:r>
             <a:endParaRPr lang="en-US" altLang="zh-TW" dirty="0" smtClean="0"/>
           </a:p>
           <a:p>
-            <a:pPr marL="0" indent="0">
-              <a:buNone/>
-            </a:pPr>
+            <a:r>
+              <a:rPr lang="en-US" altLang="zh-TW" dirty="0" smtClean="0"/>
+              <a:t>Eureka</a:t>
+            </a:r>
+          </a:p>
+          <a:p>
             <a:r>
               <a:rPr lang="zh-TW" altLang="en-US" dirty="0" smtClean="0"/>
-              <a:t>相對 </a:t>
-            </a:r>
-            <a:r>
-              <a:rPr lang="en-US" altLang="zh-TW" dirty="0" smtClean="0"/>
-              <a:t>SSM</a:t>
+              <a:t>服務註冊</a:t>
+            </a:r>
+            <a:r>
+              <a:rPr lang="en-US" altLang="zh-TW" dirty="0" smtClean="0"/>
+              <a:t>,</a:t>
             </a:r>
             <a:r>
               <a:rPr lang="zh-TW" altLang="en-US" dirty="0" smtClean="0"/>
-              <a:t>框架來說</a:t>
+              <a:t>服務發現</a:t>
+            </a:r>
+            <a:endParaRPr lang="en-US" altLang="zh-TW" dirty="0"/>
+          </a:p>
+          <a:p>
+            <a:r>
+              <a:rPr lang="en-US" altLang="zh-TW" dirty="0" err="1" smtClean="0"/>
+              <a:t>Zuul</a:t>
+            </a:r>
+            <a:r>
+              <a:rPr lang="en-US" altLang="zh-TW" dirty="0" smtClean="0"/>
+              <a:t> Gateway</a:t>
+            </a:r>
+          </a:p>
+          <a:p>
+            <a:r>
+              <a:rPr lang="zh-TW" altLang="en-US" dirty="0"/>
+              <a:t>主要</a:t>
+            </a:r>
+            <a:r>
+              <a:rPr lang="zh-TW" altLang="en-US" dirty="0" smtClean="0"/>
+              <a:t>是請求</a:t>
+            </a:r>
+            <a:r>
+              <a:rPr lang="en-US" altLang="zh-TW" dirty="0" smtClean="0"/>
+              <a:t>filter,</a:t>
+            </a:r>
+            <a:r>
+              <a:rPr lang="zh-TW" altLang="en-US" dirty="0" smtClean="0"/>
+              <a:t>請求轉發</a:t>
+            </a:r>
+            <a:r>
+              <a:rPr lang="en-US" altLang="zh-TW" dirty="0" smtClean="0"/>
+              <a:t>, </a:t>
+            </a:r>
+            <a:r>
+              <a:rPr lang="zh-TW" altLang="en-US" dirty="0" smtClean="0"/>
+              <a:t>其他一些集中的功能也能在這邊實現</a:t>
+            </a:r>
+            <a:r>
+              <a:rPr lang="en-US" altLang="zh-TW" dirty="0" smtClean="0"/>
+              <a:t>(</a:t>
+            </a:r>
+            <a:r>
+              <a:rPr lang="zh-TW" altLang="en-US" dirty="0" smtClean="0"/>
+              <a:t>像是</a:t>
+            </a:r>
+            <a:r>
+              <a:rPr lang="en-US" altLang="zh-TW" dirty="0" smtClean="0"/>
+              <a:t>user</a:t>
+            </a:r>
+            <a:r>
+              <a:rPr lang="zh-TW" altLang="en-US" dirty="0" smtClean="0"/>
+              <a:t>認證</a:t>
+            </a:r>
+            <a:r>
+              <a:rPr lang="en-US" altLang="zh-TW" dirty="0" smtClean="0"/>
+              <a:t>)</a:t>
+            </a:r>
+            <a:endParaRPr lang="en-US" altLang="zh-TW" dirty="0"/>
+          </a:p>
+          <a:p>
+            <a:r>
+              <a:rPr lang="en-US" altLang="zh-TW" dirty="0" smtClean="0"/>
+              <a:t>Spring Cloud Ribbon</a:t>
+            </a:r>
+          </a:p>
+          <a:p>
+            <a:r>
+              <a:rPr lang="zh-TW" altLang="en-US" dirty="0" smtClean="0"/>
+              <a:t>請求負載均衡功能</a:t>
+            </a:r>
+            <a:r>
+              <a:rPr lang="en-US" altLang="zh-TW" dirty="0" smtClean="0"/>
+              <a:t>(</a:t>
+            </a:r>
+            <a:r>
+              <a:rPr lang="zh-TW" altLang="en-US" dirty="0"/>
+              <a:t>需</a:t>
+            </a:r>
+            <a:r>
+              <a:rPr lang="zh-TW" altLang="en-US" dirty="0" smtClean="0"/>
+              <a:t>搭配 </a:t>
+            </a:r>
+            <a:r>
+              <a:rPr lang="en-US" altLang="zh-TW" dirty="0" smtClean="0"/>
+              <a:t>eureka,</a:t>
+            </a:r>
+            <a:r>
+              <a:rPr lang="zh-TW" altLang="en-US" dirty="0" smtClean="0"/>
+              <a:t> </a:t>
+            </a:r>
+            <a:r>
+              <a:rPr lang="en-US" altLang="zh-TW" dirty="0" smtClean="0"/>
+              <a:t>feign </a:t>
+            </a:r>
+            <a:r>
+              <a:rPr lang="zh-TW" altLang="en-US" dirty="0" smtClean="0"/>
+              <a:t>插件配合</a:t>
+            </a:r>
+            <a:r>
+              <a:rPr lang="en-US" altLang="zh-TW" dirty="0" smtClean="0"/>
+              <a:t>)</a:t>
+            </a:r>
+          </a:p>
+          <a:p>
+            <a:r>
+              <a:rPr lang="en-US" altLang="zh-TW" dirty="0" smtClean="0"/>
+              <a:t>Spring Cloud Feign (or open-feign)</a:t>
+            </a:r>
+          </a:p>
+          <a:p>
+            <a:r>
+              <a:rPr lang="zh-TW" altLang="en-US" dirty="0" smtClean="0"/>
+              <a:t>服務調用插件</a:t>
+            </a:r>
+            <a:r>
+              <a:rPr lang="en-US" altLang="zh-TW" dirty="0" smtClean="0"/>
+              <a:t>(</a:t>
+            </a:r>
+            <a:r>
+              <a:rPr lang="zh-TW" altLang="en-US" dirty="0" smtClean="0"/>
+              <a:t>我的理解是</a:t>
             </a:r>
             <a:r>
               <a:rPr lang="en-US" altLang="zh-TW" dirty="0" smtClean="0"/>
@@ -5877,244 +6104,95 @@
             </a:r>
             <a:r>
               <a:rPr lang="zh-TW" altLang="en-US" dirty="0" smtClean="0"/>
-              <a:t>方便使用許多</a:t>
-            </a:r>
-            <a:r>
-              <a:rPr lang="en-US" altLang="zh-TW" dirty="0" smtClean="0"/>
-              <a:t>.</a:t>
-            </a:r>
-          </a:p>
-          <a:p>
-            <a:pPr marL="0" indent="0">
-              <a:buNone/>
-            </a:pPr>
+              <a:t> 使用註冊服務名稱來調用</a:t>
+            </a:r>
+            <a:r>
+              <a:rPr lang="en-US" altLang="zh-TW" dirty="0" smtClean="0"/>
+              <a:t>http </a:t>
+            </a:r>
+            <a:r>
+              <a:rPr lang="en-US" altLang="zh-TW" dirty="0" err="1" smtClean="0"/>
+              <a:t>api</a:t>
+            </a:r>
+            <a:r>
+              <a:rPr lang="en-US" altLang="zh-TW" dirty="0" smtClean="0"/>
+              <a:t>)</a:t>
+            </a:r>
+            <a:endParaRPr lang="en-US" altLang="zh-TW" dirty="0"/>
+          </a:p>
+          <a:p>
+            <a:r>
+              <a:rPr lang="en-US" altLang="zh-TW" dirty="0" smtClean="0"/>
+              <a:t>Spring </a:t>
+            </a:r>
+            <a:r>
+              <a:rPr lang="en-US" altLang="zh-TW" dirty="0" err="1" smtClean="0"/>
+              <a:t>Hystrix</a:t>
+            </a:r>
             <a:endParaRPr lang="en-US" altLang="zh-TW" dirty="0" smtClean="0"/>
           </a:p>
           <a:p>
-            <a:pPr marL="0" indent="0">
-              <a:buNone/>
-            </a:pPr>
+            <a:r>
+              <a:rPr lang="en-US" altLang="zh-TW" dirty="0" err="1" smtClean="0"/>
+              <a:t>Api</a:t>
+            </a:r>
             <a:r>
               <a:rPr lang="zh-TW" altLang="en-US" dirty="0" smtClean="0"/>
-              <a:t>優點</a:t>
-            </a:r>
-            <a:r>
-              <a:rPr lang="en-US" altLang="zh-TW" dirty="0" smtClean="0"/>
-              <a:t>:</a:t>
-            </a:r>
-          </a:p>
-          <a:p>
-            <a:pPr marL="0" indent="0">
-              <a:buNone/>
-            </a:pPr>
-            <a:r>
-              <a:rPr lang="en-US" altLang="zh-TW" dirty="0" smtClean="0"/>
-              <a:t>1.</a:t>
+              <a:t>熔斷機制 </a:t>
+            </a:r>
+            <a:r>
+              <a:rPr lang="en-US" altLang="zh-TW" dirty="0" smtClean="0"/>
+              <a:t>(</a:t>
             </a:r>
             <a:r>
               <a:rPr lang="zh-TW" altLang="en-US" dirty="0" smtClean="0"/>
-              <a:t>簡單的功能連配置都不用直接引</a:t>
-            </a:r>
-            <a:r>
-              <a:rPr lang="en-US" altLang="zh-TW" dirty="0" smtClean="0"/>
-              <a:t>lib</a:t>
+              <a:t>避免整個服務連坐崩潰</a:t>
+            </a:r>
+            <a:r>
+              <a:rPr lang="en-US" altLang="zh-TW" dirty="0" smtClean="0"/>
+              <a:t>,</a:t>
             </a:r>
             <a:r>
               <a:rPr lang="zh-TW" altLang="en-US" dirty="0" smtClean="0"/>
-              <a:t>即可 </a:t>
-            </a:r>
+              <a:t>當服務被呼叫失敗超過幾次</a:t>
+            </a:r>
+            <a:r>
+              <a:rPr lang="en-US" altLang="zh-TW" dirty="0" smtClean="0"/>
+              <a:t>, </a:t>
+            </a:r>
+            <a:r>
+              <a:rPr lang="zh-TW" altLang="en-US" dirty="0" smtClean="0"/>
+              <a:t>就直接回應設定好的失敗輸出</a:t>
+            </a:r>
+            <a:r>
+              <a:rPr lang="en-US" altLang="zh-TW" dirty="0" smtClean="0"/>
+              <a:t>)</a:t>
+            </a:r>
+            <a:endParaRPr lang="en-US" altLang="zh-TW" dirty="0"/>
+          </a:p>
+          <a:p>
+            <a:r>
+              <a:rPr lang="en-US" altLang="zh-TW" dirty="0" smtClean="0"/>
+              <a:t>Spring swagger </a:t>
+            </a:r>
+          </a:p>
+          <a:p>
             <a:r>
               <a:rPr lang="en-US" altLang="zh-TW" dirty="0" smtClean="0"/>
               <a:t>(</a:t>
             </a:r>
             <a:r>
+              <a:rPr lang="en-US" altLang="zh-TW" dirty="0" err="1" smtClean="0"/>
+              <a:t>api</a:t>
+            </a:r>
+            <a:r>
               <a:rPr lang="zh-TW" altLang="en-US" dirty="0" smtClean="0"/>
-              <a:t>自動預設配置</a:t>
+              <a:t>文件格式化 提供網頁輸出</a:t>
             </a:r>
             <a:r>
               <a:rPr lang="en-US" altLang="zh-TW" dirty="0" smtClean="0"/>
               <a:t>)</a:t>
             </a:r>
-          </a:p>
-          <a:p>
-            <a:pPr marL="0" indent="0">
-              <a:buNone/>
-            </a:pPr>
-            <a:r>
-              <a:rPr lang="en-US" altLang="zh-TW" dirty="0" smtClean="0"/>
-              <a:t>2.</a:t>
-            </a:r>
-            <a:r>
-              <a:rPr lang="zh-TW" altLang="en-US" dirty="0" smtClean="0"/>
-              <a:t> 大多數的配置 直接寫在</a:t>
-            </a:r>
-            <a:r>
-              <a:rPr lang="en-US" altLang="zh-TW" dirty="0" smtClean="0"/>
-              <a:t>xml</a:t>
-            </a:r>
-            <a:r>
-              <a:rPr lang="zh-TW" altLang="en-US" dirty="0" smtClean="0"/>
-              <a:t>設定檔即可</a:t>
-            </a:r>
-            <a:r>
-              <a:rPr lang="en-US" altLang="zh-TW" dirty="0" smtClean="0"/>
-              <a:t>(</a:t>
-            </a:r>
-            <a:r>
-              <a:rPr lang="zh-TW" altLang="en-US" dirty="0" smtClean="0"/>
-              <a:t>要寫在</a:t>
-            </a:r>
-            <a:r>
-              <a:rPr lang="en-US" altLang="zh-TW" dirty="0" smtClean="0"/>
-              <a:t>JAVA</a:t>
-            </a:r>
-            <a:r>
-              <a:rPr lang="zh-TW" altLang="en-US" dirty="0" smtClean="0"/>
-              <a:t>當然也可以</a:t>
-            </a:r>
-            <a:r>
-              <a:rPr lang="en-US" altLang="zh-TW" dirty="0" smtClean="0"/>
-              <a:t>)</a:t>
-            </a:r>
-          </a:p>
-          <a:p>
-            <a:pPr marL="0" indent="0">
-              <a:buNone/>
-            </a:pPr>
-            <a:endParaRPr lang="en-US" altLang="zh-TW" dirty="0" smtClean="0"/>
-          </a:p>
-          <a:p>
-            <a:pPr marL="0" indent="0">
-              <a:buNone/>
-            </a:pPr>
-            <a:r>
-              <a:rPr lang="zh-TW" altLang="en-US" dirty="0" smtClean="0"/>
-              <a:t>缺點</a:t>
-            </a:r>
-            <a:r>
-              <a:rPr lang="en-US" altLang="zh-TW" dirty="0" smtClean="0"/>
-              <a:t>:</a:t>
-            </a:r>
-          </a:p>
-          <a:p>
-            <a:pPr marL="0" indent="0">
-              <a:buNone/>
-            </a:pPr>
-            <a:r>
-              <a:rPr lang="zh-TW" altLang="en-US" dirty="0" smtClean="0"/>
-              <a:t>自動配置是個兩面刃</a:t>
-            </a:r>
-            <a:r>
-              <a:rPr lang="en-US" altLang="zh-TW" dirty="0" smtClean="0"/>
-              <a:t>,</a:t>
-            </a:r>
-            <a:r>
-              <a:rPr lang="zh-TW" altLang="en-US" dirty="0" smtClean="0"/>
-              <a:t>很難去追內部怎麼運作</a:t>
-            </a:r>
-            <a:r>
-              <a:rPr lang="en-US" altLang="zh-TW" dirty="0" smtClean="0"/>
-              <a:t>,</a:t>
-            </a:r>
-            <a:r>
-              <a:rPr lang="zh-TW" altLang="en-US" dirty="0" smtClean="0"/>
-              <a:t>這是其一</a:t>
-            </a:r>
-            <a:r>
-              <a:rPr lang="en-US" altLang="zh-TW" dirty="0" smtClean="0"/>
-              <a:t>,</a:t>
-            </a:r>
-          </a:p>
-          <a:p>
-            <a:pPr marL="0" indent="0">
-              <a:buNone/>
-            </a:pPr>
-            <a:r>
-              <a:rPr lang="zh-TW" altLang="en-US" dirty="0"/>
-              <a:t>第二</a:t>
-            </a:r>
-            <a:r>
-              <a:rPr lang="zh-TW" altLang="en-US" dirty="0" smtClean="0"/>
-              <a:t>是</a:t>
-            </a:r>
-            <a:r>
-              <a:rPr lang="en-US" altLang="zh-TW" dirty="0" smtClean="0"/>
-              <a:t>starter</a:t>
-            </a:r>
-            <a:r>
-              <a:rPr lang="zh-TW" altLang="en-US" dirty="0" smtClean="0"/>
-              <a:t>的包都給你裝配好</a:t>
-            </a:r>
-            <a:r>
-              <a:rPr lang="en-US" altLang="zh-TW" dirty="0" smtClean="0"/>
-              <a:t>,</a:t>
-            </a:r>
-            <a:r>
-              <a:rPr lang="zh-TW" altLang="en-US" dirty="0" smtClean="0"/>
-              <a:t> 不同的</a:t>
-            </a:r>
-            <a:r>
-              <a:rPr lang="en-US" altLang="zh-TW" dirty="0" smtClean="0"/>
-              <a:t>starter</a:t>
-            </a:r>
-            <a:r>
-              <a:rPr lang="zh-TW" altLang="en-US" dirty="0" smtClean="0"/>
-              <a:t>裡面可能有相同的依賴包</a:t>
-            </a:r>
-            <a:r>
-              <a:rPr lang="en-US" altLang="zh-TW" dirty="0" smtClean="0"/>
-              <a:t>,</a:t>
-            </a:r>
-            <a:r>
-              <a:rPr lang="zh-TW" altLang="en-US" dirty="0" smtClean="0"/>
-              <a:t>但是版本不同</a:t>
-            </a:r>
-            <a:r>
-              <a:rPr lang="en-US" altLang="zh-TW" dirty="0" smtClean="0"/>
-              <a:t>,</a:t>
-            </a:r>
-          </a:p>
-          <a:p>
-            <a:pPr marL="0" indent="0">
-              <a:buNone/>
-            </a:pPr>
-            <a:r>
-              <a:rPr lang="zh-TW" altLang="en-US" dirty="0"/>
-              <a:t>有時候會</a:t>
-            </a:r>
-            <a:r>
-              <a:rPr lang="zh-TW" altLang="en-US" dirty="0" smtClean="0"/>
-              <a:t>衝突</a:t>
-            </a:r>
-            <a:r>
-              <a:rPr lang="en-US" altLang="zh-TW" dirty="0" smtClean="0"/>
-              <a:t>,</a:t>
-            </a:r>
-            <a:r>
-              <a:rPr lang="zh-TW" altLang="en-US" dirty="0" smtClean="0"/>
-              <a:t>這還得去追依賴引用解決問題</a:t>
-            </a:r>
-            <a:r>
-              <a:rPr lang="en-US" altLang="zh-TW" smtClean="0"/>
-              <a:t>.</a:t>
-            </a:r>
-          </a:p>
-          <a:p>
-            <a:pPr marL="0" indent="0">
-              <a:buNone/>
-            </a:pPr>
-            <a:endParaRPr lang="en-US" altLang="zh-TW" smtClean="0"/>
-          </a:p>
-          <a:p>
-            <a:pPr marL="0" indent="0">
-              <a:buNone/>
-            </a:pPr>
-            <a:endParaRPr lang="en-US" altLang="zh-TW" dirty="0"/>
-          </a:p>
-          <a:p>
-            <a:pPr marL="0" indent="0">
-              <a:buNone/>
-            </a:pPr>
             <a:endParaRPr lang="zh-TW" altLang="en-US" dirty="0"/>
           </a:p>
         </p:txBody>
@@ -6122,7 +6200,7 @@
     </p:spTree>
     <p:extLst>
       <p:ext uri="{BB962C8B-B14F-4D97-AF65-F5344CB8AC3E}">
-        <p14:creationId xmlns:p14="http://schemas.microsoft.com/office/powerpoint/2010/main" val="35645824"/>
+        <p14:creationId xmlns:p14="http://schemas.microsoft.com/office/powerpoint/2010/main" val="2624643691"/>
       </p:ext>
     </p:extLst>
   </p:cSld>
@@ -6149,146 +6227,14 @@
           <a:chExt cx="0" cy="0"/>
         </a:xfrm>
       </p:grpSpPr>
-      <p:graphicFrame>
-        <p:nvGraphicFramePr>
-          <p:cNvPr id="3" name="对象 2" hidden="1">
-            <a:extLst>
-              <a:ext uri="{FF2B5EF4-FFF2-40B4-BE49-F238E27FC236}">
-                <a16:creationId xmlns="" xmlns:p14="http://schemas.microsoft.com/office/powerpoint/2010/main" xmlns:mc="http://schemas.openxmlformats.org/markup-compatibility/2006" xmlns:v="urn:schemas-microsoft-com:vml" xmlns:a16="http://schemas.microsoft.com/office/drawing/2014/main" id="{A6A819F1-33AF-45D7-8BF6-2B0A9769CAD4}"/>
-              </a:ext>
-            </a:extLst>
-          </p:cNvPr>
-          <p:cNvGraphicFramePr>
-            <a:graphicFrameLocks noChangeAspect="1"/>
-          </p:cNvGraphicFramePr>
-          <p:nvPr>
-            <p:extLst>
-              <p:ext uri="{D42A27DB-BD31-4B8C-83A1-F6EECF244321}">
-                <p14:modId xmlns:p14="http://schemas.microsoft.com/office/powerpoint/2010/main" val="1096986971"/>
-              </p:ext>
-            </p:extLst>
-          </p:nvPr>
-        </p:nvGraphicFramePr>
-        <p:xfrm>
-          <a:off x="1588" y="1588"/>
-          <a:ext cx="1588" cy="1588"/>
-        </p:xfrm>
-        <a:graphic>
-          <a:graphicData uri="http://schemas.openxmlformats.org/presentationml/2006/ole">
-            <mc:AlternateContent xmlns:mc="http://schemas.openxmlformats.org/markup-compatibility/2006">
-              <mc:Choice xmlns:v="urn:schemas-microsoft-com:vml" Requires="v">
-                <p:oleObj spid="_x0000_s3167" name="think-cell Slide" r:id="rId5" imgW="347" imgH="348" progId="TCLayout.ActiveDocument.1">
-                  <p:embed/>
-                </p:oleObj>
-              </mc:Choice>
-              <mc:Fallback>
-                <p:oleObj name="think-cell Slide" r:id="rId5" imgW="347" imgH="348" progId="TCLayout.ActiveDocument.1">
-                  <p:embed/>
-                  <p:pic>
-                    <p:nvPicPr>
-                      <p:cNvPr id="3" name="对象 2" hidden="1">
-                        <a:extLst>
-                          <a:ext uri="{FF2B5EF4-FFF2-40B4-BE49-F238E27FC236}">
-                            <a16:creationId xmlns="" xmlns:p14="http://schemas.microsoft.com/office/powerpoint/2010/main" xmlns:v="urn:schemas-microsoft-com:vml" xmlns:a16="http://schemas.microsoft.com/office/drawing/2014/main" id="{A6A819F1-33AF-45D7-8BF6-2B0A9769CAD4}"/>
-                          </a:ext>
-                        </a:extLst>
-                      </p:cNvPr>
-                      <p:cNvPicPr/>
-                      <p:nvPr/>
-                    </p:nvPicPr>
-                    <p:blipFill>
-                      <a:blip r:embed="rId6"/>
-                      <a:stretch>
-                        <a:fillRect/>
-                      </a:stretch>
-                    </p:blipFill>
-                    <p:spPr>
-                      <a:xfrm>
-                        <a:off x="1588" y="1588"/>
-                        <a:ext cx="1588" cy="1588"/>
-                      </a:xfrm>
-                      <a:prstGeom prst="rect">
-                        <a:avLst/>
-                      </a:prstGeom>
-                    </p:spPr>
-                  </p:pic>
-                </p:oleObj>
-              </mc:Fallback>
-            </mc:AlternateContent>
-          </a:graphicData>
-        </a:graphic>
-      </p:graphicFrame>
       <p:sp>
         <p:nvSpPr>
-          <p:cNvPr id="2" name="矩形 1" hidden="1">
-            <a:extLst>
-              <a:ext uri="{FF2B5EF4-FFF2-40B4-BE49-F238E27FC236}">
-                <a16:creationId xmlns="" xmlns:p14="http://schemas.microsoft.com/office/powerpoint/2010/main" xmlns:mc="http://schemas.openxmlformats.org/markup-compatibility/2006" xmlns:v="urn:schemas-microsoft-com:vml" xmlns:a16="http://schemas.microsoft.com/office/drawing/2014/main" id="{FF51F16D-1BAD-46EE-A6F4-B8B94C9DF628}"/>
-              </a:ext>
-            </a:extLst>
-          </p:cNvPr>
-          <p:cNvSpPr/>
-          <p:nvPr/>
-        </p:nvSpPr>
-        <p:spPr>
-          <a:xfrm>
-            <a:off x="0" y="0"/>
-            <a:ext cx="158750" cy="158750"/>
-          </a:xfrm>
-          <a:prstGeom prst="rect">
-            <a:avLst/>
-          </a:prstGeom>
-        </p:spPr>
-        <p:style>
-          <a:lnRef idx="2">
-            <a:schemeClr val="accent1">
-              <a:shade val="50000"/>
-            </a:schemeClr>
-          </a:lnRef>
-          <a:fillRef idx="1">
-            <a:schemeClr val="accent1"/>
-          </a:fillRef>
-          <a:effectRef idx="0">
-            <a:schemeClr val="accent1"/>
-          </a:effectRef>
-          <a:fontRef idx="minor">
-            <a:schemeClr val="lt1"/>
-          </a:fontRef>
-        </p:style>
-        <p:txBody>
-          <a:bodyPr vert="horz" wrap="none" lIns="0" tIns="0" rIns="0" bIns="0" numCol="1" spcCol="0" rtlCol="0" anchor="ctr" anchorCtr="0">
-            <a:noAutofit/>
-          </a:bodyPr>
-          <a:lstStyle/>
-          <a:p>
-            <a:pPr algn="ctr">
-              <a:lnSpc>
-                <a:spcPct val="90000"/>
-              </a:lnSpc>
-              <a:spcBef>
-                <a:spcPct val="0"/>
-              </a:spcBef>
-              <a:spcAft>
-                <a:spcPct val="0"/>
-              </a:spcAft>
-            </a:pPr>
-            <a:endParaRPr lang="en-US" altLang="zh-CN" sz="2400" dirty="0">
-              <a:latin typeface="Arial" panose="020B0604020202020204" pitchFamily="34" charset="0"/>
-              <a:ea typeface="微软雅黑" panose="020B0503020204020204" pitchFamily="34" charset="-122"/>
-              <a:cs typeface="+mj-cs"/>
-              <a:sym typeface="Arial" panose="020B0604020202020204" pitchFamily="34" charset="0"/>
-            </a:endParaRPr>
-          </a:p>
-        </p:txBody>
-      </p:sp>
-      <p:sp>
-        <p:nvSpPr>
-          <p:cNvPr id="5" name="标题 4"/>
+          <p:cNvPr id="2" name="頁尾版面配置區 1"/>
           <p:cNvSpPr>
             <a:spLocks noGrp="1"/>
           </p:cNvSpPr>
           <p:nvPr>
-            <p:ph type="ctrTitle"/>
+            <p:ph type="ftr" sz="quarter" idx="11"/>
           </p:nvPr>
         </p:nvSpPr>
         <p:spPr/>
@@ -6297,82 +6243,29 @@
           <a:lstStyle/>
           <a:p>
             <a:r>
-              <a:rPr lang="en-US" altLang="zh-CN" sz="10000" smtClean="0">
-                <a:solidFill>
-                  <a:schemeClr val="accent2">
-                    <a:lumMod val="50000"/>
-                  </a:schemeClr>
-                </a:solidFill>
-              </a:rPr>
-              <a:t>Tha</a:t>
-            </a:r>
-            <a:r>
-              <a:rPr lang="en-US" altLang="zh-CN" sz="100" smtClean="0">
-                <a:solidFill>
-                  <a:schemeClr val="accent2">
-                    <a:lumMod val="50000"/>
-                  </a:schemeClr>
-                </a:solidFill>
-              </a:rPr>
-              <a:t> </a:t>
-            </a:r>
-            <a:r>
-              <a:rPr lang="en-US" altLang="zh-CN" sz="10000" smtClean="0">
-                <a:solidFill>
-                  <a:schemeClr val="accent2">
-                    <a:lumMod val="50000"/>
-                  </a:schemeClr>
-                </a:solidFill>
-              </a:rPr>
-              <a:t>nks</a:t>
-            </a:r>
-            <a:r>
-              <a:rPr lang="en-US" altLang="zh-CN" dirty="0">
-                <a:solidFill>
-                  <a:schemeClr val="accent2">
-                    <a:lumMod val="50000"/>
-                  </a:schemeClr>
-                </a:solidFill>
-              </a:rPr>
-              <a:t/>
-            </a:r>
-            <a:br>
-              <a:rPr lang="en-US" altLang="zh-CN" dirty="0">
-                <a:solidFill>
-                  <a:schemeClr val="accent2">
-                    <a:lumMod val="50000"/>
-                  </a:schemeClr>
-                </a:solidFill>
-              </a:rPr>
-            </a:br>
-            <a:r>
-              <a:rPr lang="en-US" altLang="zh-CN" dirty="0">
-                <a:solidFill>
-                  <a:schemeClr val="accent2">
-                    <a:lumMod val="50000"/>
-                  </a:schemeClr>
-                </a:solidFill>
-              </a:rPr>
-              <a:t>And Your Slogan Here</a:t>
-            </a:r>
-            <a:endParaRPr lang="zh-CN" altLang="en-US" dirty="0">
-              <a:solidFill>
-                <a:schemeClr val="accent2">
-                  <a:lumMod val="50000"/>
-                </a:schemeClr>
-              </a:solidFill>
-            </a:endParaRPr>
+              <a:rPr lang="zh-CN" altLang="en-US" smtClean="0"/>
+              <a:t>请在插入菜单</a:t>
+            </a:r>
+            <a:r>
+              <a:rPr lang="en-US" altLang="zh-CN" smtClean="0"/>
+              <a:t>—</a:t>
+            </a:r>
+            <a:r>
+              <a:rPr lang="zh-CN" altLang="en-US" smtClean="0"/>
+              <a:t>页眉和页脚中修改此文本</a:t>
+            </a:r>
+            <a:endParaRPr lang="zh-CN" altLang="en-US" dirty="0"/>
           </a:p>
         </p:txBody>
       </p:sp>
       <p:sp>
         <p:nvSpPr>
-          <p:cNvPr id="7" name="文本占位符 6"/>
+          <p:cNvPr id="3" name="投影片編號版面配置區 2"/>
           <p:cNvSpPr>
             <a:spLocks noGrp="1"/>
           </p:cNvSpPr>
           <p:nvPr>
-            <p:ph type="body" sz="quarter" idx="18"/>
+            <p:ph type="sldNum" sz="quarter" idx="12"/>
           </p:nvPr>
         </p:nvSpPr>
         <p:spPr/>
@@ -6380,30 +6273,23 @@
           <a:bodyPr/>
           <a:lstStyle/>
           <a:p>
-            <a:r>
-              <a:rPr lang="en-US" altLang="zh-CN" smtClean="0"/>
-              <a:t>ww</a:t>
-            </a:r>
-            <a:r>
-              <a:rPr lang="en-US" altLang="zh-CN" sz="100" smtClean="0"/>
-              <a:t> </a:t>
-            </a:r>
-            <a:r>
-              <a:rPr lang="en-US" altLang="zh-CN" smtClean="0"/>
-              <a:t>w.islide.cc</a:t>
-            </a:r>
-            <a:endParaRPr lang="en-US" altLang="en-US" dirty="0"/>
+            <a:fld id="{5DD3DB80-B894-403A-B48E-6FDC1A72010E}" type="slidenum">
+              <a:rPr lang="zh-CN" altLang="en-US" smtClean="0"/>
+              <a:pPr/>
+              <a:t>19</a:t>
+            </a:fld>
+            <a:endParaRPr lang="zh-CN" altLang="en-US"/>
           </a:p>
         </p:txBody>
       </p:sp>
       <p:sp>
         <p:nvSpPr>
-          <p:cNvPr id="6" name="文本占位符 5"/>
+          <p:cNvPr id="4" name="標題 3"/>
           <p:cNvSpPr>
             <a:spLocks noGrp="1"/>
           </p:cNvSpPr>
           <p:nvPr>
-            <p:ph type="body" sz="quarter" idx="10"/>
+            <p:ph type="title"/>
           </p:nvPr>
         </p:nvSpPr>
         <p:spPr/>
@@ -6412,45 +6298,202 @@
           <a:lstStyle/>
           <a:p>
             <a:r>
-              <a:rPr lang="en-US" altLang="zh-CN" smtClean="0"/>
-              <a:t>Spe</a:t>
-            </a:r>
-            <a:r>
-              <a:rPr lang="en-US" altLang="zh-CN" sz="100" smtClean="0"/>
+              <a:rPr lang="en-US" altLang="zh-TW" dirty="0" smtClean="0"/>
+              <a:t>Spring Cloud Introduce</a:t>
+            </a:r>
+            <a:endParaRPr lang="zh-TW" altLang="en-US" dirty="0"/>
+          </a:p>
+        </p:txBody>
+      </p:sp>
+      <p:sp>
+        <p:nvSpPr>
+          <p:cNvPr id="5" name="內容版面配置區 4"/>
+          <p:cNvSpPr>
+            <a:spLocks noGrp="1"/>
+          </p:cNvSpPr>
+          <p:nvPr>
+            <p:ph sz="quarter" idx="13"/>
+          </p:nvPr>
+        </p:nvSpPr>
+        <p:spPr/>
+        <p:txBody>
+          <a:bodyPr>
+            <a:normAutofit/>
+          </a:bodyPr>
+          <a:lstStyle/>
+          <a:p>
+            <a:r>
+              <a:rPr lang="en-US" altLang="zh-TW" sz="2000" dirty="0" smtClean="0"/>
+              <a:t>A function library set for cloud </a:t>
+            </a:r>
+            <a:r>
+              <a:rPr lang="en-US" altLang="zh-TW" sz="2000" dirty="0"/>
+              <a:t>a</a:t>
+            </a:r>
+            <a:r>
+              <a:rPr lang="en-US" altLang="zh-TW" sz="2000" dirty="0" smtClean="0"/>
+              <a:t>pplication.</a:t>
+            </a:r>
+          </a:p>
+          <a:p>
+            <a:r>
+              <a:rPr lang="zh-TW" altLang="en-US" dirty="0"/>
+              <a:t>下面列出</a:t>
+            </a:r>
+            <a:r>
+              <a:rPr lang="zh-TW" altLang="en-US" dirty="0" smtClean="0"/>
+              <a:t>一些常用的基本套件</a:t>
+            </a:r>
+            <a:endParaRPr lang="en-US" altLang="zh-TW" dirty="0" smtClean="0"/>
+          </a:p>
+          <a:p>
+            <a:endParaRPr lang="en-US" altLang="zh-TW" dirty="0"/>
+          </a:p>
+          <a:p>
+            <a:r>
+              <a:rPr lang="en-US" altLang="zh-TW" dirty="0" smtClean="0"/>
+              <a:t>Spring Cloud Security </a:t>
+            </a:r>
+          </a:p>
+          <a:p>
+            <a:r>
+              <a:rPr lang="zh-TW" altLang="en-US" dirty="0" smtClean="0"/>
+              <a:t>提供使用者驗證等安全相關的套件</a:t>
+            </a:r>
+            <a:r>
+              <a:rPr lang="en-US" altLang="zh-TW" dirty="0" smtClean="0"/>
+              <a:t>, </a:t>
+            </a:r>
+            <a:r>
+              <a:rPr lang="zh-TW" altLang="en-US" dirty="0" smtClean="0"/>
+              <a:t>像是 </a:t>
+            </a:r>
+            <a:r>
+              <a:rPr lang="en-US" altLang="zh-TW" dirty="0" smtClean="0"/>
+              <a:t>oauth2</a:t>
+            </a:r>
+            <a:r>
+              <a:rPr lang="zh-TW" altLang="en-US" dirty="0" smtClean="0"/>
+              <a:t> 的實現</a:t>
+            </a:r>
+            <a:r>
+              <a:rPr lang="en-US" altLang="zh-TW" dirty="0" smtClean="0"/>
+              <a:t>, </a:t>
+            </a:r>
+            <a:r>
+              <a:rPr lang="zh-TW" altLang="en-US" dirty="0" smtClean="0"/>
+              <a:t>基本的登入驗證功能</a:t>
+            </a:r>
+            <a:endParaRPr lang="en-US" altLang="zh-TW" dirty="0" smtClean="0"/>
+          </a:p>
+          <a:p>
+            <a:endParaRPr lang="en-US" altLang="zh-TW" dirty="0" smtClean="0"/>
+          </a:p>
+          <a:p>
+            <a:r>
+              <a:rPr lang="en-US" altLang="zh-TW" dirty="0" smtClean="0"/>
+              <a:t>Spring Data </a:t>
+            </a:r>
+            <a:r>
+              <a:rPr lang="en-US" altLang="zh-TW" dirty="0" err="1" smtClean="0"/>
+              <a:t>Redis</a:t>
+            </a:r>
+            <a:r>
+              <a:rPr lang="zh-TW" altLang="en-US" dirty="0" smtClean="0"/>
               <a:t> </a:t>
             </a:r>
-            <a:r>
-              <a:rPr lang="en-US" altLang="zh-CN" smtClean="0"/>
-              <a:t>aker </a:t>
-            </a:r>
-            <a:r>
-              <a:rPr lang="en-US" altLang="zh-CN"/>
-              <a:t>name and title</a:t>
-            </a:r>
-            <a:endParaRPr lang="en-US" altLang="zh-CN" dirty="0"/>
+            <a:endParaRPr lang="en-US" altLang="zh-TW" dirty="0" smtClean="0"/>
+          </a:p>
+          <a:p>
+            <a:r>
+              <a:rPr lang="zh-TW" altLang="en-US" dirty="0" smtClean="0"/>
+              <a:t>分布式緩存 套件</a:t>
+            </a:r>
+            <a:r>
+              <a:rPr lang="en-US" altLang="zh-TW" dirty="0" smtClean="0"/>
+              <a:t>, </a:t>
+            </a:r>
+            <a:r>
+              <a:rPr lang="zh-TW" altLang="en-US" dirty="0"/>
+              <a:t>可</a:t>
+            </a:r>
+            <a:r>
+              <a:rPr lang="zh-TW" altLang="en-US" dirty="0" smtClean="0"/>
+              <a:t>提供</a:t>
+            </a:r>
+            <a:r>
+              <a:rPr lang="zh-TW" altLang="en-US" dirty="0"/>
+              <a:t>快取</a:t>
+            </a:r>
+            <a:r>
+              <a:rPr lang="zh-TW" altLang="en-US" dirty="0" smtClean="0"/>
+              <a:t>功能</a:t>
+            </a:r>
+            <a:endParaRPr lang="en-US" altLang="zh-TW" dirty="0" smtClean="0"/>
+          </a:p>
+          <a:p>
+            <a:r>
+              <a:rPr lang="zh-TW" altLang="en-US" dirty="0" smtClean="0"/>
+              <a:t>像是驗證服務的 </a:t>
+            </a:r>
+            <a:r>
+              <a:rPr lang="en-US" altLang="zh-TW" dirty="0" smtClean="0"/>
+              <a:t>token ,session cache, </a:t>
+            </a:r>
+            <a:r>
+              <a:rPr lang="zh-TW" altLang="en-US" dirty="0"/>
+              <a:t>分享</a:t>
+            </a:r>
+            <a:r>
+              <a:rPr lang="zh-TW" altLang="en-US" dirty="0" smtClean="0"/>
+              <a:t>存取</a:t>
+            </a:r>
+            <a:endParaRPr lang="en-US" altLang="zh-TW" dirty="0"/>
+          </a:p>
+          <a:p>
+            <a:endParaRPr lang="en-US" altLang="zh-TW" dirty="0" smtClean="0"/>
+          </a:p>
+          <a:p>
+            <a:r>
+              <a:rPr lang="zh-TW" altLang="en-US" dirty="0"/>
+              <a:t>上述</a:t>
+            </a:r>
+            <a:r>
+              <a:rPr lang="zh-TW" altLang="en-US" dirty="0" smtClean="0"/>
+              <a:t>列出一些常用的</a:t>
+            </a:r>
+            <a:r>
+              <a:rPr lang="en-US" altLang="zh-TW" dirty="0" smtClean="0"/>
+              <a:t>,</a:t>
+            </a:r>
+            <a:r>
+              <a:rPr lang="zh-TW" altLang="en-US" dirty="0"/>
+              <a:t>還有</a:t>
+            </a:r>
+            <a:r>
+              <a:rPr lang="zh-TW" altLang="en-US" dirty="0" smtClean="0"/>
+              <a:t>許多套件可以上官方網站查看</a:t>
+            </a:r>
+            <a:endParaRPr lang="en-US" altLang="zh-TW" dirty="0" smtClean="0"/>
+          </a:p>
+          <a:p>
+            <a:r>
+              <a:rPr lang="en-US" altLang="zh-TW" dirty="0"/>
+              <a:t>https://spring.io/projects/spring-cloud</a:t>
+            </a:r>
           </a:p>
         </p:txBody>
       </p:sp>
     </p:spTree>
-    <p:custDataLst>
-      <p:tags r:id="rId3"/>
-    </p:custDataLst>
     <p:extLst>
       <p:ext uri="{BB962C8B-B14F-4D97-AF65-F5344CB8AC3E}">
-        <p14:creationId xmlns:p14="http://schemas.microsoft.com/office/powerpoint/2010/main" val="1259043032"/>
+        <p14:creationId xmlns:p14="http://schemas.microsoft.com/office/powerpoint/2010/main" val="1102858973"/>
       </p:ext>
     </p:extLst>
   </p:cSld>
   <p:clrMapOvr>
     <a:masterClrMapping/>
   </p:clrMapOvr>
-  <p:timing>
-    <p:tnLst>
-      <p:par>
-        <p:cTn id="1" dur="indefinite" restart="never" nodeType="tmRoot"/>
-      </p:par>
-    </p:tnLst>
-  </p:timing>
 </p:sld>
 </file>
 
@@ -6476,7 +6519,7 @@
           <p:cNvPr id="2" name="组合 1">
             <a:extLst>
               <a:ext uri="{FF2B5EF4-FFF2-40B4-BE49-F238E27FC236}">
-                <a16:creationId xmlns="" xmlns:p14="http://schemas.microsoft.com/office/powerpoint/2010/main" xmlns:a16="http://schemas.microsoft.com/office/drawing/2014/main" id="{C0498D3A-B738-48EC-A39C-94C58B88932B}"/>
+                <a16:creationId xmlns:a16="http://schemas.microsoft.com/office/drawing/2014/main" xmlns:p14="http://schemas.microsoft.com/office/powerpoint/2010/main" xmlns="" id="{C0498D3A-B738-48EC-A39C-94C58B88932B}"/>
               </a:ext>
             </a:extLst>
           </p:cNvPr>
@@ -6496,7 +6539,7 @@
             <p:cNvPr id="6" name="2b751056-6b97-492c-b763-340acee7e99d" descr="本素材由iSlide™ 提供&#10;iSlide™尊重知识产权并注重保护用户享有的各项权利。郑重提醒您：&#10;iSlide™插件中提供的任何信息内容的所有权、知识产权归其原始权利人或权利受让人所有，您免费/购买获得的是信息内容的使用权，并受下述条款的约束；&#10;1. 您仅可以个人非商业用途使用该等信息内容，不可将信息内容的全部或部分用于出售，或以出租、出借、转让、分销、发布等其他任何方式供他人使用；&#10;2. 禁止在接入互联网或移动互联网的任何网站、平台、应用或程序上以任何方式为他人提供iSlide™插件资源内容的下载。&#10;The resource is supplied by iSlide™.&#10;iSlide™ respects all intellectual property rights and protects all the rights its users acquired.Solemnly remind you:&#10;The ownership and intellectual property of the resources supplied in iSlide Add-in belongs to its owner or the assignee of this ownership.you only acquired the usage of the resources supplied in iSlide Add-in, as well as respected the following restrain terms:&#10;1.You are only allowed to use such resource for personal and non-commercial aim, not allowed to use such resource or part of it for the sale; or rent, lend, transfer to others; or distribution or release it in any way.&#10;2.You are not permitted to provide the resource of iSlide Add-in in any website, platform, application access to the Internet or mobile Internet." title="iSlide™ 版权声明  COPYRIGHT NOTICE">
               <a:extLst>
                 <a:ext uri="{FF2B5EF4-FFF2-40B4-BE49-F238E27FC236}">
-                  <a16:creationId xmlns="" xmlns:p14="http://schemas.microsoft.com/office/powerpoint/2010/main" xmlns:a16="http://schemas.microsoft.com/office/drawing/2014/main" id="{A759C196-DA28-4241-ABB5-975367026FE9}"/>
+                  <a16:creationId xmlns:a16="http://schemas.microsoft.com/office/drawing/2014/main" xmlns:p14="http://schemas.microsoft.com/office/powerpoint/2010/main" xmlns="" id="{A759C196-DA28-4241-ABB5-975367026FE9}"/>
                 </a:ext>
               </a:extLst>
             </p:cNvPr>
@@ -6518,7 +6561,7 @@
               <p:cNvPr id="7" name="iṡľïḑè">
                 <a:extLst>
                   <a:ext uri="{FF2B5EF4-FFF2-40B4-BE49-F238E27FC236}">
-                    <a16:creationId xmlns="" xmlns:p14="http://schemas.microsoft.com/office/powerpoint/2010/main" xmlns:a16="http://schemas.microsoft.com/office/drawing/2014/main" id="{48F70259-7598-4270-874A-6F50772D10F6}"/>
+                    <a16:creationId xmlns:a16="http://schemas.microsoft.com/office/drawing/2014/main" xmlns:p14="http://schemas.microsoft.com/office/powerpoint/2010/main" xmlns="" id="{48F70259-7598-4270-874A-6F50772D10F6}"/>
                   </a:ext>
                 </a:extLst>
               </p:cNvPr>
@@ -6741,7 +6784,15 @@
                     <a:ea typeface="+mn-ea"/>
                     <a:sym typeface="+mn-lt"/>
                   </a:rPr>
-                  <a:t>Spring boot Framework Introduce</a:t>
+                  <a:t>Spring boot Framework </a:t>
+                </a:r>
+                <a:r>
+                  <a:rPr lang="en-US" altLang="zh-TW" sz="2400" dirty="0" smtClean="0">
+                    <a:latin typeface="+mn-lt"/>
+                    <a:ea typeface="+mn-ea"/>
+                    <a:sym typeface="+mn-lt"/>
+                  </a:rPr>
+                  <a:t>Introduce</a:t>
                 </a:r>
               </a:p>
               <a:p>
@@ -6752,7 +6803,51 @@
                   <a:buFont typeface="+mj-lt"/>
                   <a:buAutoNum type="arabicPeriod"/>
                 </a:pPr>
-                <a:endParaRPr lang="en-US" altLang="zh-TW" sz="2400" dirty="0">
+                <a:endParaRPr lang="en-US" altLang="zh-TW" dirty="0" smtClean="0">
+                  <a:latin typeface="+mn-lt"/>
+                  <a:ea typeface="+mn-ea"/>
+                  <a:sym typeface="+mn-lt"/>
+                </a:endParaRPr>
+              </a:p>
+              <a:p>
+                <a:pPr marL="342900" indent="-342900">
+                  <a:lnSpc>
+                    <a:spcPct val="150000"/>
+                  </a:lnSpc>
+                  <a:buFont typeface="+mj-lt"/>
+                  <a:buAutoNum type="arabicPeriod"/>
+                </a:pPr>
+                <a:r>
+                  <a:rPr lang="en-US" altLang="zh-TW" sz="2400" dirty="0" smtClean="0">
+                    <a:latin typeface="+mn-lt"/>
+                    <a:ea typeface="+mn-ea"/>
+                    <a:sym typeface="+mn-lt"/>
+                  </a:rPr>
+                  <a:t>Spring Cloud </a:t>
+                </a:r>
+                <a:r>
+                  <a:rPr lang="zh-TW" altLang="en-US" sz="2400" dirty="0" smtClean="0">
+                    <a:latin typeface="+mn-lt"/>
+                    <a:ea typeface="+mn-ea"/>
+                    <a:sym typeface="+mn-lt"/>
+                  </a:rPr>
+                  <a:t>簡介</a:t>
+                </a:r>
+                <a:endParaRPr lang="en-US" altLang="zh-TW" sz="2400" dirty="0" smtClean="0">
+                  <a:latin typeface="+mn-lt"/>
+                  <a:ea typeface="+mn-ea"/>
+                  <a:sym typeface="+mn-lt"/>
+                </a:endParaRPr>
+              </a:p>
+              <a:p>
+                <a:pPr marL="342900" indent="-342900">
+                  <a:lnSpc>
+                    <a:spcPct val="150000"/>
+                  </a:lnSpc>
+                  <a:buFont typeface="+mj-lt"/>
+                  <a:buAutoNum type="arabicPeriod"/>
+                </a:pPr>
+                <a:endParaRPr lang="en-US" altLang="zh-TW" sz="1800" dirty="0">
                   <a:latin typeface="+mn-lt"/>
                   <a:ea typeface="+mn-ea"/>
                   <a:sym typeface="+mn-lt"/>
@@ -6799,7 +6894,7 @@
               <p:cNvPr id="8" name="直接连接符 7">
                 <a:extLst>
                   <a:ext uri="{FF2B5EF4-FFF2-40B4-BE49-F238E27FC236}">
-                    <a16:creationId xmlns="" xmlns:p14="http://schemas.microsoft.com/office/powerpoint/2010/main" xmlns:a16="http://schemas.microsoft.com/office/drawing/2014/main" id="{DA1FB18E-FA01-4588-BEF9-FB96A98A84D4}"/>
+                    <a16:creationId xmlns:a16="http://schemas.microsoft.com/office/drawing/2014/main" xmlns:p14="http://schemas.microsoft.com/office/powerpoint/2010/main" xmlns="" id="{DA1FB18E-FA01-4588-BEF9-FB96A98A84D4}"/>
                   </a:ext>
                 </a:extLst>
               </p:cNvPr>
@@ -6838,7 +6933,7 @@
               <p:cNvPr id="9" name="išľïḋé">
                 <a:extLst>
                   <a:ext uri="{FF2B5EF4-FFF2-40B4-BE49-F238E27FC236}">
-                    <a16:creationId xmlns="" xmlns:p14="http://schemas.microsoft.com/office/powerpoint/2010/main" xmlns:a16="http://schemas.microsoft.com/office/drawing/2014/main" id="{0DB1D0A1-2667-455C-9387-D7ABF0A00B8C}"/>
+                    <a16:creationId xmlns:a16="http://schemas.microsoft.com/office/drawing/2014/main" xmlns:p14="http://schemas.microsoft.com/office/powerpoint/2010/main" xmlns="" id="{0DB1D0A1-2667-455C-9387-D7ABF0A00B8C}"/>
                   </a:ext>
                 </a:extLst>
               </p:cNvPr>
@@ -6910,7 +7005,7 @@
             <p:cNvPr id="10" name="poetry_91022">
               <a:extLst>
                 <a:ext uri="{FF2B5EF4-FFF2-40B4-BE49-F238E27FC236}">
-                  <a16:creationId xmlns="" xmlns:p14="http://schemas.microsoft.com/office/powerpoint/2010/main" xmlns:a16="http://schemas.microsoft.com/office/drawing/2014/main" id="{ADAD6BE3-DC11-4582-9F68-50D831ADD001}"/>
+                  <a16:creationId xmlns:a16="http://schemas.microsoft.com/office/drawing/2014/main" xmlns:p14="http://schemas.microsoft.com/office/powerpoint/2010/main" xmlns="" id="{ADAD6BE3-DC11-4582-9F68-50D831ADD001}"/>
                 </a:ext>
               </a:extLst>
             </p:cNvPr>
@@ -7522,6 +7617,698 @@
 </p:sld>
 </file>
 
+<file path=ppt/slides/slide20.xml><?xml version="1.0" encoding="utf-8"?>
+<p:sld xmlns:a="http://schemas.openxmlformats.org/drawingml/2006/main" xmlns:r="http://schemas.openxmlformats.org/officeDocument/2006/relationships" xmlns:p="http://schemas.openxmlformats.org/presentationml/2006/main">
+  <p:cSld>
+    <p:spTree>
+      <p:nvGrpSpPr>
+        <p:cNvPr id="1" name=""/>
+        <p:cNvGrpSpPr/>
+        <p:nvPr/>
+      </p:nvGrpSpPr>
+      <p:grpSpPr>
+        <a:xfrm>
+          <a:off x="0" y="0"/>
+          <a:ext cx="0" cy="0"/>
+          <a:chOff x="0" y="0"/>
+          <a:chExt cx="0" cy="0"/>
+        </a:xfrm>
+      </p:grpSpPr>
+      <p:sp>
+        <p:nvSpPr>
+          <p:cNvPr id="2" name="頁尾版面配置區 1"/>
+          <p:cNvSpPr>
+            <a:spLocks noGrp="1"/>
+          </p:cNvSpPr>
+          <p:nvPr>
+            <p:ph type="ftr" sz="quarter" idx="11"/>
+          </p:nvPr>
+        </p:nvSpPr>
+        <p:spPr/>
+        <p:txBody>
+          <a:bodyPr/>
+          <a:lstStyle/>
+          <a:p>
+            <a:r>
+              <a:rPr lang="zh-CN" altLang="en-US" smtClean="0"/>
+              <a:t>请在插入菜单</a:t>
+            </a:r>
+            <a:r>
+              <a:rPr lang="en-US" altLang="zh-CN" smtClean="0"/>
+              <a:t>—</a:t>
+            </a:r>
+            <a:r>
+              <a:rPr lang="zh-CN" altLang="en-US" smtClean="0"/>
+              <a:t>页眉和页脚中修改此文本</a:t>
+            </a:r>
+            <a:endParaRPr lang="zh-CN" altLang="en-US" dirty="0"/>
+          </a:p>
+        </p:txBody>
+      </p:sp>
+      <p:sp>
+        <p:nvSpPr>
+          <p:cNvPr id="3" name="投影片編號版面配置區 2"/>
+          <p:cNvSpPr>
+            <a:spLocks noGrp="1"/>
+          </p:cNvSpPr>
+          <p:nvPr>
+            <p:ph type="sldNum" sz="quarter" idx="12"/>
+          </p:nvPr>
+        </p:nvSpPr>
+        <p:spPr/>
+        <p:txBody>
+          <a:bodyPr/>
+          <a:lstStyle/>
+          <a:p>
+            <a:fld id="{5DD3DB80-B894-403A-B48E-6FDC1A72010E}" type="slidenum">
+              <a:rPr lang="zh-CN" altLang="en-US" smtClean="0"/>
+              <a:pPr/>
+              <a:t>20</a:t>
+            </a:fld>
+            <a:endParaRPr lang="zh-CN" altLang="en-US"/>
+          </a:p>
+        </p:txBody>
+      </p:sp>
+      <p:sp>
+        <p:nvSpPr>
+          <p:cNvPr id="4" name="標題 3"/>
+          <p:cNvSpPr>
+            <a:spLocks noGrp="1"/>
+          </p:cNvSpPr>
+          <p:nvPr>
+            <p:ph type="title"/>
+          </p:nvPr>
+        </p:nvSpPr>
+        <p:spPr/>
+        <p:txBody>
+          <a:bodyPr/>
+          <a:lstStyle/>
+          <a:p>
+            <a:r>
+              <a:rPr lang="zh-TW" altLang="en-US" dirty="0"/>
+              <a:t>總結</a:t>
+            </a:r>
+          </a:p>
+        </p:txBody>
+      </p:sp>
+      <p:sp>
+        <p:nvSpPr>
+          <p:cNvPr id="5" name="內容版面配置區 4"/>
+          <p:cNvSpPr>
+            <a:spLocks noGrp="1"/>
+          </p:cNvSpPr>
+          <p:nvPr>
+            <p:ph sz="quarter" idx="13"/>
+          </p:nvPr>
+        </p:nvSpPr>
+        <p:spPr/>
+        <p:txBody>
+          <a:bodyPr/>
+          <a:lstStyle/>
+          <a:p>
+            <a:pPr marL="0" indent="0">
+              <a:buNone/>
+            </a:pPr>
+            <a:endParaRPr lang="en-US" altLang="zh-TW" dirty="0" smtClean="0"/>
+          </a:p>
+          <a:p>
+            <a:pPr marL="0" indent="0">
+              <a:buNone/>
+            </a:pPr>
+            <a:r>
+              <a:rPr lang="zh-TW" altLang="en-US" dirty="0" smtClean="0"/>
+              <a:t>相對 </a:t>
+            </a:r>
+            <a:r>
+              <a:rPr lang="en-US" altLang="zh-TW" dirty="0" smtClean="0"/>
+              <a:t>SSM</a:t>
+            </a:r>
+            <a:r>
+              <a:rPr lang="zh-TW" altLang="en-US" dirty="0" smtClean="0"/>
+              <a:t>框架來說</a:t>
+            </a:r>
+            <a:r>
+              <a:rPr lang="en-US" altLang="zh-TW" dirty="0" smtClean="0"/>
+              <a:t>,</a:t>
+            </a:r>
+            <a:r>
+              <a:rPr lang="zh-TW" altLang="en-US" dirty="0" smtClean="0"/>
+              <a:t>方便使用許多</a:t>
+            </a:r>
+            <a:r>
+              <a:rPr lang="en-US" altLang="zh-TW" dirty="0" smtClean="0"/>
+              <a:t>.</a:t>
+            </a:r>
+          </a:p>
+          <a:p>
+            <a:pPr marL="0" indent="0">
+              <a:buNone/>
+            </a:pPr>
+            <a:endParaRPr lang="en-US" altLang="zh-TW" dirty="0" smtClean="0"/>
+          </a:p>
+          <a:p>
+            <a:pPr marL="0" indent="0">
+              <a:buNone/>
+            </a:pPr>
+            <a:r>
+              <a:rPr lang="zh-TW" altLang="en-US" dirty="0" smtClean="0"/>
+              <a:t>優點</a:t>
+            </a:r>
+            <a:r>
+              <a:rPr lang="en-US" altLang="zh-TW" dirty="0" smtClean="0"/>
+              <a:t>:</a:t>
+            </a:r>
+          </a:p>
+          <a:p>
+            <a:pPr marL="0" indent="0">
+              <a:buNone/>
+            </a:pPr>
+            <a:r>
+              <a:rPr lang="en-US" altLang="zh-TW" dirty="0" smtClean="0"/>
+              <a:t>1.</a:t>
+            </a:r>
+            <a:r>
+              <a:rPr lang="zh-TW" altLang="en-US" dirty="0" smtClean="0"/>
+              <a:t>簡單的功能連配置都不用直接引</a:t>
+            </a:r>
+            <a:r>
+              <a:rPr lang="en-US" altLang="zh-TW" dirty="0" smtClean="0"/>
+              <a:t>lib</a:t>
+            </a:r>
+            <a:r>
+              <a:rPr lang="zh-TW" altLang="en-US" dirty="0" smtClean="0"/>
+              <a:t>即可 </a:t>
+            </a:r>
+            <a:r>
+              <a:rPr lang="en-US" altLang="zh-TW" dirty="0" smtClean="0"/>
+              <a:t>(</a:t>
+            </a:r>
+            <a:r>
+              <a:rPr lang="zh-TW" altLang="en-US" dirty="0" smtClean="0"/>
+              <a:t>自動預設配置</a:t>
+            </a:r>
+            <a:r>
+              <a:rPr lang="en-US" altLang="zh-TW" dirty="0" smtClean="0"/>
+              <a:t>)</a:t>
+            </a:r>
+          </a:p>
+          <a:p>
+            <a:pPr marL="0" indent="0">
+              <a:buNone/>
+            </a:pPr>
+            <a:r>
+              <a:rPr lang="en-US" altLang="zh-TW" dirty="0" smtClean="0"/>
+              <a:t>2.</a:t>
+            </a:r>
+            <a:r>
+              <a:rPr lang="zh-TW" altLang="en-US" dirty="0" smtClean="0"/>
+              <a:t> 大多數的配置 直接寫在</a:t>
+            </a:r>
+            <a:r>
+              <a:rPr lang="en-US" altLang="zh-TW" dirty="0" smtClean="0"/>
+              <a:t>xml</a:t>
+            </a:r>
+            <a:r>
+              <a:rPr lang="zh-TW" altLang="en-US" dirty="0" smtClean="0"/>
+              <a:t>設定檔即可</a:t>
+            </a:r>
+            <a:r>
+              <a:rPr lang="en-US" altLang="zh-TW" dirty="0" smtClean="0"/>
+              <a:t>(</a:t>
+            </a:r>
+            <a:r>
+              <a:rPr lang="zh-TW" altLang="en-US" dirty="0" smtClean="0"/>
+              <a:t>要寫在</a:t>
+            </a:r>
+            <a:r>
+              <a:rPr lang="en-US" altLang="zh-TW" dirty="0" smtClean="0"/>
+              <a:t>JAVA</a:t>
+            </a:r>
+            <a:r>
+              <a:rPr lang="zh-TW" altLang="en-US" dirty="0" smtClean="0"/>
+              <a:t>當然也可以</a:t>
+            </a:r>
+            <a:r>
+              <a:rPr lang="en-US" altLang="zh-TW" dirty="0" smtClean="0"/>
+              <a:t>)</a:t>
+            </a:r>
+          </a:p>
+          <a:p>
+            <a:pPr marL="0" indent="0">
+              <a:buNone/>
+            </a:pPr>
+            <a:endParaRPr lang="en-US" altLang="zh-TW" dirty="0" smtClean="0"/>
+          </a:p>
+          <a:p>
+            <a:pPr marL="0" indent="0">
+              <a:buNone/>
+            </a:pPr>
+            <a:r>
+              <a:rPr lang="zh-TW" altLang="en-US" dirty="0" smtClean="0"/>
+              <a:t>缺點</a:t>
+            </a:r>
+            <a:r>
+              <a:rPr lang="en-US" altLang="zh-TW" dirty="0" smtClean="0"/>
+              <a:t>:</a:t>
+            </a:r>
+          </a:p>
+          <a:p>
+            <a:pPr marL="0" indent="0">
+              <a:buNone/>
+            </a:pPr>
+            <a:r>
+              <a:rPr lang="zh-TW" altLang="en-US" dirty="0" smtClean="0"/>
+              <a:t>自動配置是個兩面刃</a:t>
+            </a:r>
+            <a:r>
+              <a:rPr lang="en-US" altLang="zh-TW" dirty="0" smtClean="0"/>
+              <a:t>,</a:t>
+            </a:r>
+            <a:r>
+              <a:rPr lang="zh-TW" altLang="en-US" dirty="0" smtClean="0"/>
+              <a:t>很難去追內部怎麼運作</a:t>
+            </a:r>
+            <a:r>
+              <a:rPr lang="en-US" altLang="zh-TW" dirty="0" smtClean="0"/>
+              <a:t>,</a:t>
+            </a:r>
+            <a:r>
+              <a:rPr lang="zh-TW" altLang="en-US" dirty="0" smtClean="0"/>
+              <a:t>這是其一</a:t>
+            </a:r>
+            <a:r>
+              <a:rPr lang="en-US" altLang="zh-TW" dirty="0" smtClean="0"/>
+              <a:t>,</a:t>
+            </a:r>
+          </a:p>
+          <a:p>
+            <a:pPr marL="0" indent="0">
+              <a:buNone/>
+            </a:pPr>
+            <a:r>
+              <a:rPr lang="zh-TW" altLang="en-US" dirty="0"/>
+              <a:t>第二</a:t>
+            </a:r>
+            <a:r>
+              <a:rPr lang="zh-TW" altLang="en-US" dirty="0" smtClean="0"/>
+              <a:t>是</a:t>
+            </a:r>
+            <a:r>
+              <a:rPr lang="en-US" altLang="zh-TW" dirty="0" smtClean="0"/>
+              <a:t>starter</a:t>
+            </a:r>
+            <a:r>
+              <a:rPr lang="zh-TW" altLang="en-US" dirty="0" smtClean="0"/>
+              <a:t>的包都給你裝配好</a:t>
+            </a:r>
+            <a:r>
+              <a:rPr lang="en-US" altLang="zh-TW" dirty="0" smtClean="0"/>
+              <a:t>,</a:t>
+            </a:r>
+            <a:r>
+              <a:rPr lang="zh-TW" altLang="en-US" dirty="0" smtClean="0"/>
+              <a:t> 不同的</a:t>
+            </a:r>
+            <a:r>
+              <a:rPr lang="en-US" altLang="zh-TW" dirty="0" smtClean="0"/>
+              <a:t>starter</a:t>
+            </a:r>
+            <a:r>
+              <a:rPr lang="zh-TW" altLang="en-US" dirty="0" smtClean="0"/>
+              <a:t>裡面可能有相同的依賴包</a:t>
+            </a:r>
+            <a:r>
+              <a:rPr lang="en-US" altLang="zh-TW" dirty="0" smtClean="0"/>
+              <a:t>,</a:t>
+            </a:r>
+            <a:r>
+              <a:rPr lang="zh-TW" altLang="en-US" dirty="0" smtClean="0"/>
+              <a:t>但是版本不同</a:t>
+            </a:r>
+            <a:r>
+              <a:rPr lang="en-US" altLang="zh-TW" dirty="0" smtClean="0"/>
+              <a:t>,</a:t>
+            </a:r>
+          </a:p>
+          <a:p>
+            <a:pPr marL="0" indent="0">
+              <a:buNone/>
+            </a:pPr>
+            <a:r>
+              <a:rPr lang="zh-TW" altLang="en-US" dirty="0"/>
+              <a:t>有時候會</a:t>
+            </a:r>
+            <a:r>
+              <a:rPr lang="zh-TW" altLang="en-US" dirty="0" smtClean="0"/>
+              <a:t>衝突</a:t>
+            </a:r>
+            <a:r>
+              <a:rPr lang="en-US" altLang="zh-TW" dirty="0" smtClean="0"/>
+              <a:t>,</a:t>
+            </a:r>
+            <a:r>
+              <a:rPr lang="zh-TW" altLang="en-US" dirty="0" smtClean="0"/>
+              <a:t>這還得去追依賴引用解決問題</a:t>
+            </a:r>
+            <a:r>
+              <a:rPr lang="en-US" altLang="zh-TW" dirty="0" smtClean="0"/>
+              <a:t>.</a:t>
+            </a:r>
+          </a:p>
+          <a:p>
+            <a:pPr marL="0" indent="0">
+              <a:buNone/>
+            </a:pPr>
+            <a:endParaRPr lang="en-US" altLang="zh-TW" dirty="0" smtClean="0"/>
+          </a:p>
+          <a:p>
+            <a:pPr marL="0" indent="0">
+              <a:buNone/>
+            </a:pPr>
+            <a:endParaRPr lang="en-US" altLang="zh-TW" dirty="0"/>
+          </a:p>
+          <a:p>
+            <a:pPr marL="0" indent="0">
+              <a:buNone/>
+            </a:pPr>
+            <a:endParaRPr lang="zh-TW" altLang="en-US" dirty="0"/>
+          </a:p>
+        </p:txBody>
+      </p:sp>
+    </p:spTree>
+    <p:extLst>
+      <p:ext uri="{BB962C8B-B14F-4D97-AF65-F5344CB8AC3E}">
+        <p14:creationId xmlns:p14="http://schemas.microsoft.com/office/powerpoint/2010/main" val="35645824"/>
+      </p:ext>
+    </p:extLst>
+  </p:cSld>
+  <p:clrMapOvr>
+    <a:masterClrMapping/>
+  </p:clrMapOvr>
+</p:sld>
+</file>
+
+<file path=ppt/slides/slide21.xml><?xml version="1.0" encoding="utf-8"?>
+<p:sld xmlns:a="http://schemas.openxmlformats.org/drawingml/2006/main" xmlns:r="http://schemas.openxmlformats.org/officeDocument/2006/relationships" xmlns:p="http://schemas.openxmlformats.org/presentationml/2006/main">
+  <p:cSld>
+    <p:spTree>
+      <p:nvGrpSpPr>
+        <p:cNvPr id="1" name=""/>
+        <p:cNvGrpSpPr/>
+        <p:nvPr/>
+      </p:nvGrpSpPr>
+      <p:grpSpPr>
+        <a:xfrm>
+          <a:off x="0" y="0"/>
+          <a:ext cx="0" cy="0"/>
+          <a:chOff x="0" y="0"/>
+          <a:chExt cx="0" cy="0"/>
+        </a:xfrm>
+      </p:grpSpPr>
+      <p:graphicFrame>
+        <p:nvGraphicFramePr>
+          <p:cNvPr id="3" name="对象 2" hidden="1">
+            <a:extLst>
+              <a:ext uri="{FF2B5EF4-FFF2-40B4-BE49-F238E27FC236}">
+                <a16:creationId xmlns:a16="http://schemas.microsoft.com/office/drawing/2014/main" xmlns:v="urn:schemas-microsoft-com:vml" xmlns:mc="http://schemas.openxmlformats.org/markup-compatibility/2006" xmlns:p14="http://schemas.microsoft.com/office/powerpoint/2010/main" xmlns="" id="{A6A819F1-33AF-45D7-8BF6-2B0A9769CAD4}"/>
+              </a:ext>
+            </a:extLst>
+          </p:cNvPr>
+          <p:cNvGraphicFramePr>
+            <a:graphicFrameLocks noChangeAspect="1"/>
+          </p:cNvGraphicFramePr>
+          <p:nvPr>
+            <p:extLst>
+              <p:ext uri="{D42A27DB-BD31-4B8C-83A1-F6EECF244321}">
+                <p14:modId xmlns:p14="http://schemas.microsoft.com/office/powerpoint/2010/main" val="1096986971"/>
+              </p:ext>
+            </p:extLst>
+          </p:nvPr>
+        </p:nvGraphicFramePr>
+        <p:xfrm>
+          <a:off x="1588" y="1588"/>
+          <a:ext cx="1588" cy="1588"/>
+        </p:xfrm>
+        <a:graphic>
+          <a:graphicData uri="http://schemas.openxmlformats.org/presentationml/2006/ole">
+            <mc:AlternateContent xmlns:mc="http://schemas.openxmlformats.org/markup-compatibility/2006">
+              <mc:Choice xmlns:v="urn:schemas-microsoft-com:vml" Requires="v">
+                <p:oleObj spid="_x0000_s3189" name="think-cell Slide" r:id="rId5" imgW="347" imgH="348" progId="TCLayout.ActiveDocument.1">
+                  <p:embed/>
+                </p:oleObj>
+              </mc:Choice>
+              <mc:Fallback>
+                <p:oleObj name="think-cell Slide" r:id="rId5" imgW="347" imgH="348" progId="TCLayout.ActiveDocument.1">
+                  <p:embed/>
+                  <p:pic>
+                    <p:nvPicPr>
+                      <p:cNvPr id="3" name="对象 2" hidden="1">
+                        <a:extLst>
+                          <a:ext uri="{FF2B5EF4-FFF2-40B4-BE49-F238E27FC236}">
+                            <a16:creationId xmlns:a16="http://schemas.microsoft.com/office/drawing/2014/main" xmlns:v="urn:schemas-microsoft-com:vml" xmlns:p14="http://schemas.microsoft.com/office/powerpoint/2010/main" xmlns="" id="{A6A819F1-33AF-45D7-8BF6-2B0A9769CAD4}"/>
+                          </a:ext>
+                        </a:extLst>
+                      </p:cNvPr>
+                      <p:cNvPicPr/>
+                      <p:nvPr/>
+                    </p:nvPicPr>
+                    <p:blipFill>
+                      <a:blip r:embed="rId6"/>
+                      <a:stretch>
+                        <a:fillRect/>
+                      </a:stretch>
+                    </p:blipFill>
+                    <p:spPr>
+                      <a:xfrm>
+                        <a:off x="1588" y="1588"/>
+                        <a:ext cx="1588" cy="1588"/>
+                      </a:xfrm>
+                      <a:prstGeom prst="rect">
+                        <a:avLst/>
+                      </a:prstGeom>
+                    </p:spPr>
+                  </p:pic>
+                </p:oleObj>
+              </mc:Fallback>
+            </mc:AlternateContent>
+          </a:graphicData>
+        </a:graphic>
+      </p:graphicFrame>
+      <p:sp>
+        <p:nvSpPr>
+          <p:cNvPr id="2" name="矩形 1" hidden="1">
+            <a:extLst>
+              <a:ext uri="{FF2B5EF4-FFF2-40B4-BE49-F238E27FC236}">
+                <a16:creationId xmlns:a16="http://schemas.microsoft.com/office/drawing/2014/main" xmlns:v="urn:schemas-microsoft-com:vml" xmlns:mc="http://schemas.openxmlformats.org/markup-compatibility/2006" xmlns:p14="http://schemas.microsoft.com/office/powerpoint/2010/main" xmlns="" id="{FF51F16D-1BAD-46EE-A6F4-B8B94C9DF628}"/>
+              </a:ext>
+            </a:extLst>
+          </p:cNvPr>
+          <p:cNvSpPr/>
+          <p:nvPr/>
+        </p:nvSpPr>
+        <p:spPr>
+          <a:xfrm>
+            <a:off x="0" y="0"/>
+            <a:ext cx="158750" cy="158750"/>
+          </a:xfrm>
+          <a:prstGeom prst="rect">
+            <a:avLst/>
+          </a:prstGeom>
+        </p:spPr>
+        <p:style>
+          <a:lnRef idx="2">
+            <a:schemeClr val="accent1">
+              <a:shade val="50000"/>
+            </a:schemeClr>
+          </a:lnRef>
+          <a:fillRef idx="1">
+            <a:schemeClr val="accent1"/>
+          </a:fillRef>
+          <a:effectRef idx="0">
+            <a:schemeClr val="accent1"/>
+          </a:effectRef>
+          <a:fontRef idx="minor">
+            <a:schemeClr val="lt1"/>
+          </a:fontRef>
+        </p:style>
+        <p:txBody>
+          <a:bodyPr vert="horz" wrap="none" lIns="0" tIns="0" rIns="0" bIns="0" numCol="1" spcCol="0" rtlCol="0" anchor="ctr" anchorCtr="0">
+            <a:noAutofit/>
+          </a:bodyPr>
+          <a:lstStyle/>
+          <a:p>
+            <a:pPr algn="ctr">
+              <a:lnSpc>
+                <a:spcPct val="90000"/>
+              </a:lnSpc>
+              <a:spcBef>
+                <a:spcPct val="0"/>
+              </a:spcBef>
+              <a:spcAft>
+                <a:spcPct val="0"/>
+              </a:spcAft>
+            </a:pPr>
+            <a:endParaRPr lang="en-US" altLang="zh-CN" sz="2400" dirty="0">
+              <a:latin typeface="Arial" panose="020B0604020202020204" pitchFamily="34" charset="0"/>
+              <a:ea typeface="微软雅黑" panose="020B0503020204020204" pitchFamily="34" charset="-122"/>
+              <a:cs typeface="+mj-cs"/>
+              <a:sym typeface="Arial" panose="020B0604020202020204" pitchFamily="34" charset="0"/>
+            </a:endParaRPr>
+          </a:p>
+        </p:txBody>
+      </p:sp>
+      <p:sp>
+        <p:nvSpPr>
+          <p:cNvPr id="5" name="标题 4"/>
+          <p:cNvSpPr>
+            <a:spLocks noGrp="1"/>
+          </p:cNvSpPr>
+          <p:nvPr>
+            <p:ph type="ctrTitle"/>
+          </p:nvPr>
+        </p:nvSpPr>
+        <p:spPr/>
+        <p:txBody>
+          <a:bodyPr/>
+          <a:lstStyle/>
+          <a:p>
+            <a:r>
+              <a:rPr lang="en-US" altLang="zh-CN" sz="10000" dirty="0" err="1" smtClean="0">
+                <a:solidFill>
+                  <a:schemeClr val="accent2">
+                    <a:lumMod val="50000"/>
+                  </a:schemeClr>
+                </a:solidFill>
+              </a:rPr>
+              <a:t>Tha</a:t>
+            </a:r>
+            <a:r>
+              <a:rPr lang="en-US" altLang="zh-CN" sz="100" dirty="0" smtClean="0">
+                <a:solidFill>
+                  <a:schemeClr val="accent2">
+                    <a:lumMod val="50000"/>
+                  </a:schemeClr>
+                </a:solidFill>
+              </a:rPr>
+              <a:t> </a:t>
+            </a:r>
+            <a:r>
+              <a:rPr lang="en-US" altLang="zh-CN" sz="10000" dirty="0" err="1" smtClean="0">
+                <a:solidFill>
+                  <a:schemeClr val="accent2">
+                    <a:lumMod val="50000"/>
+                  </a:schemeClr>
+                </a:solidFill>
+              </a:rPr>
+              <a:t>nks</a:t>
+            </a:r>
+            <a:r>
+              <a:rPr lang="en-US" altLang="zh-CN" dirty="0">
+                <a:solidFill>
+                  <a:schemeClr val="accent2">
+                    <a:lumMod val="50000"/>
+                  </a:schemeClr>
+                </a:solidFill>
+              </a:rPr>
+              <a:t/>
+            </a:r>
+            <a:br>
+              <a:rPr lang="en-US" altLang="zh-CN" dirty="0">
+                <a:solidFill>
+                  <a:schemeClr val="accent2">
+                    <a:lumMod val="50000"/>
+                  </a:schemeClr>
+                </a:solidFill>
+              </a:rPr>
+            </a:br>
+            <a:r>
+              <a:rPr lang="en-US" altLang="zh-CN" dirty="0" smtClean="0">
+                <a:solidFill>
+                  <a:schemeClr val="accent2">
+                    <a:lumMod val="50000"/>
+                  </a:schemeClr>
+                </a:solidFill>
+              </a:rPr>
+              <a:t>Do it ,Not just Talk.</a:t>
+            </a:r>
+            <a:endParaRPr lang="zh-CN" altLang="en-US" dirty="0">
+              <a:solidFill>
+                <a:schemeClr val="accent2">
+                  <a:lumMod val="50000"/>
+                </a:schemeClr>
+              </a:solidFill>
+            </a:endParaRPr>
+          </a:p>
+        </p:txBody>
+      </p:sp>
+      <p:sp>
+        <p:nvSpPr>
+          <p:cNvPr id="6" name="文本占位符 5"/>
+          <p:cNvSpPr>
+            <a:spLocks noGrp="1"/>
+          </p:cNvSpPr>
+          <p:nvPr>
+            <p:ph type="body" sz="quarter" idx="10"/>
+          </p:nvPr>
+        </p:nvSpPr>
+        <p:spPr/>
+        <p:txBody>
+          <a:bodyPr/>
+          <a:lstStyle/>
+          <a:p>
+            <a:r>
+              <a:rPr lang="en-US" altLang="zh-CN" dirty="0" smtClean="0"/>
+              <a:t>Sean</a:t>
+            </a:r>
+          </a:p>
+        </p:txBody>
+      </p:sp>
+      <p:sp>
+        <p:nvSpPr>
+          <p:cNvPr id="4" name="文字版面配置區 3"/>
+          <p:cNvSpPr>
+            <a:spLocks noGrp="1"/>
+          </p:cNvSpPr>
+          <p:nvPr>
+            <p:ph type="body" sz="quarter" idx="18"/>
+          </p:nvPr>
+        </p:nvSpPr>
+        <p:spPr/>
+        <p:txBody>
+          <a:bodyPr/>
+          <a:lstStyle/>
+          <a:p>
+            <a:r>
+              <a:rPr lang="en-US" altLang="zh-TW" dirty="0" smtClean="0"/>
+              <a:t>   </a:t>
+            </a:r>
+            <a:endParaRPr lang="zh-TW" altLang="en-US" dirty="0"/>
+          </a:p>
+        </p:txBody>
+      </p:sp>
+    </p:spTree>
+    <p:custDataLst>
+      <p:tags r:id="rId3"/>
+    </p:custDataLst>
+    <p:extLst>
+      <p:ext uri="{BB962C8B-B14F-4D97-AF65-F5344CB8AC3E}">
+        <p14:creationId xmlns:p14="http://schemas.microsoft.com/office/powerpoint/2010/main" val="1259043032"/>
+      </p:ext>
+    </p:extLst>
+  </p:cSld>
+  <p:clrMapOvr>
+    <a:masterClrMapping/>
+  </p:clrMapOvr>
+  <p:timing>
+    <p:tnLst>
+      <p:par>
+        <p:cTn id="1" dur="indefinite" restart="never" nodeType="tmRoot"/>
+      </p:par>
+    </p:tnLst>
+  </p:timing>
+</p:sld>
+</file>
+
 <file path=ppt/slides/slide3.xml><?xml version="1.0" encoding="utf-8"?>
 <p:sld xmlns:a="http://schemas.openxmlformats.org/drawingml/2006/main" xmlns:r="http://schemas.openxmlformats.org/officeDocument/2006/relationships" xmlns:p="http://schemas.openxmlformats.org/presentationml/2006/main">
   <p:cSld>
@@ -7591,7 +8378,7 @@
           <p:cNvPr id="9" name="文本框 8">
             <a:extLst>
               <a:ext uri="{FF2B5EF4-FFF2-40B4-BE49-F238E27FC236}">
-                <a16:creationId xmlns="" xmlns:p14="http://schemas.microsoft.com/office/powerpoint/2010/main" xmlns:a16="http://schemas.microsoft.com/office/drawing/2014/main" id="{04F69230-F3A6-4586-9371-A858F4763E9F}"/>
+                <a16:creationId xmlns:a16="http://schemas.microsoft.com/office/drawing/2014/main" xmlns:p14="http://schemas.microsoft.com/office/powerpoint/2010/main" xmlns="" id="{04F69230-F3A6-4586-9371-A858F4763E9F}"/>
               </a:ext>
             </a:extLst>
           </p:cNvPr>
@@ -8037,7 +8824,19 @@
             </a:r>
             <a:r>
               <a:rPr lang="en-US" altLang="zh-TW" dirty="0"/>
-              <a:t>A popular </a:t>
+              <a:t>A </a:t>
+            </a:r>
+            <a:r>
+              <a:rPr lang="en-US" altLang="zh-TW" b="1" dirty="0">
+                <a:solidFill>
+                  <a:srgbClr val="FF0000"/>
+                </a:solidFill>
+              </a:rPr>
+              <a:t>popular</a:t>
+            </a:r>
+            <a:r>
+              <a:rPr lang="en-US" altLang="zh-TW" dirty="0"/>
+              <a:t> </a:t>
             </a:r>
             <a:r>
               <a:rPr lang="en-US" altLang="zh-TW" dirty="0" smtClean="0"/>
@@ -8168,7 +8967,7 @@
           <p:cNvPr id="9" name="文本框 8">
             <a:extLst>
               <a:ext uri="{FF2B5EF4-FFF2-40B4-BE49-F238E27FC236}">
-                <a16:creationId xmlns="" xmlns:p14="http://schemas.microsoft.com/office/powerpoint/2010/main" xmlns:a16="http://schemas.microsoft.com/office/drawing/2014/main" id="{04F69230-F3A6-4586-9371-A858F4763E9F}"/>
+                <a16:creationId xmlns:a16="http://schemas.microsoft.com/office/drawing/2014/main" xmlns:p14="http://schemas.microsoft.com/office/powerpoint/2010/main" xmlns="" id="{04F69230-F3A6-4586-9371-A858F4763E9F}"/>
               </a:ext>
             </a:extLst>
           </p:cNvPr>
@@ -8440,16 +9239,36 @@
           </a:p>
           <a:p>
             <a:r>
-              <a:rPr lang="en-US" altLang="zh-CN" dirty="0"/>
-              <a:t>Spring </a:t>
-            </a:r>
-            <a:r>
-              <a:rPr lang="en-US" altLang="zh-CN" dirty="0" err="1" smtClean="0"/>
-              <a:t>BootJPA</a:t>
+              <a:rPr lang="en-US" altLang="zh-CN" dirty="0" smtClean="0">
+                <a:solidFill>
+                  <a:srgbClr val="FF0000"/>
+                </a:solidFill>
+              </a:rPr>
+              <a:t>Spring-data-</a:t>
+            </a:r>
+            <a:r>
+              <a:rPr lang="en-US" altLang="zh-CN" dirty="0" err="1" smtClean="0">
+                <a:solidFill>
+                  <a:srgbClr val="FF0000"/>
+                </a:solidFill>
+              </a:rPr>
+              <a:t>jpa</a:t>
+            </a:r>
+            <a:r>
+              <a:rPr lang="en-US" altLang="zh-CN" dirty="0" smtClean="0">
+                <a:solidFill>
+                  <a:srgbClr val="FF0000"/>
+                </a:solidFill>
+              </a:rPr>
+              <a:t> </a:t>
             </a:r>
             <a:r>
               <a:rPr lang="zh-CN" altLang="en-US" dirty="0" smtClean="0"/>
-              <a:t>就是約定優於配置</a:t>
+              <a:t>就是</a:t>
+            </a:r>
+            <a:r>
+              <a:rPr lang="zh-CN" altLang="en-US" dirty="0" smtClean="0"/>
+              <a:t>約定優於配置</a:t>
             </a:r>
             <a:r>
               <a:rPr lang="zh-TW" altLang="en-US" dirty="0" smtClean="0"/>
@@ -9576,6 +10395,12 @@
 </file>
 
 <file path=ppt/tags/tag8.xml><?xml version="1.0" encoding="utf-8"?>
+<p:tagLst xmlns:a="http://schemas.openxmlformats.org/drawingml/2006/main" xmlns:r="http://schemas.openxmlformats.org/officeDocument/2006/relationships" xmlns:p="http://schemas.openxmlformats.org/presentationml/2006/main">
+  <p:tag name="ISLIDE.THEME" val="https://www.islide.cc;"/>
+</p:tagLst>
+</file>
+
+<file path=ppt/tags/tag9.xml><?xml version="1.0" encoding="utf-8"?>
 <p:tagLst xmlns:a="http://schemas.openxmlformats.org/drawingml/2006/main" xmlns:r="http://schemas.openxmlformats.org/officeDocument/2006/relationships" xmlns:p="http://schemas.openxmlformats.org/presentationml/2006/main">
   <p:tag name="ISLIDE.THEME" val="https://www.islide.cc;"/>
 </p:tagLst>
@@ -9802,7 +10627,7 @@
   <a:extraClrSchemeLst/>
   <a:extLst>
     <a:ext uri="{05A4C25C-085E-4340-85A3-A5531E510DB2}">
-      <thm15:themeFamily xmlns="" xmlns:thm15="http://schemas.microsoft.com/office/thememl/2012/main" name="主题5" id="{B8EDB911-D765-4A7B-BBC7-40DBB672FBA6}" vid="{AECAB1C0-5DF6-436C-85E8-20094DBE11C0}"/>
+      <thm15:themeFamily xmlns:thm15="http://schemas.microsoft.com/office/thememl/2012/main" xmlns="" name="主题5" id="{B8EDB911-D765-4A7B-BBC7-40DBB672FBA6}" vid="{AECAB1C0-5DF6-436C-85E8-20094DBE11C0}"/>
     </a:ext>
   </a:extLst>
 </a:theme>
@@ -10063,7 +10888,7 @@
   <a:extraClrSchemeLst/>
   <a:extLst>
     <a:ext uri="{05A4C25C-085E-4340-85A3-A5531E510DB2}">
-      <thm15:themeFamily xmlns="" xmlns:thm15="http://schemas.microsoft.com/office/thememl/2012/main" name="Office Theme" id="{62F939B6-93AF-4DB8-9C6B-D6C7DFDC589F}" vid="{4A3C46E8-61CC-4603-A589-7422A47A8E4A}"/>
+      <thm15:themeFamily xmlns:thm15="http://schemas.microsoft.com/office/thememl/2012/main" xmlns="" name="Office Theme" id="{62F939B6-93AF-4DB8-9C6B-D6C7DFDC589F}" vid="{4A3C46E8-61CC-4603-A589-7422A47A8E4A}"/>
     </a:ext>
   </a:extLst>
 </a:theme>
@@ -10358,7 +11183,7 @@
   <a:extraClrSchemeLst/>
   <a:extLst>
     <a:ext uri="{05A4C25C-085E-4340-85A3-A5531E510DB2}">
-      <thm15:themeFamily xmlns="" xmlns:thm15="http://schemas.microsoft.com/office/thememl/2012/main" name="Office Theme" id="{62F939B6-93AF-4DB8-9C6B-D6C7DFDC589F}" vid="{4A3C46E8-61CC-4603-A589-7422A47A8E4A}"/>
+      <thm15:themeFamily xmlns:thm15="http://schemas.microsoft.com/office/thememl/2012/main" xmlns="" name="Office Theme" id="{62F939B6-93AF-4DB8-9C6B-D6C7DFDC589F}" vid="{4A3C46E8-61CC-4603-A589-7422A47A8E4A}"/>
     </a:ext>
   </a:extLst>
 </a:theme>
@@ -10620,4 +11445,47 @@
     </a:folHlink>
   </a:clrScheme>
 </a:themeOverride>
+</file>
+
+<file path=ppt/theme/themeOverride7.xml><?xml version="1.0" encoding="utf-8"?>
+<a:themeOverride xmlns:a="http://schemas.openxmlformats.org/drawingml/2006/main">
+  <a:clrScheme name="房利美">
+    <a:dk1>
+      <a:srgbClr val="000000"/>
+    </a:dk1>
+    <a:lt1>
+      <a:srgbClr val="FFFFFF"/>
+    </a:lt1>
+    <a:dk2>
+      <a:srgbClr val="768394"/>
+    </a:dk2>
+    <a:lt2>
+      <a:srgbClr val="F0F0F0"/>
+    </a:lt2>
+    <a:accent1>
+      <a:srgbClr val="CE5D47"/>
+    </a:accent1>
+    <a:accent2>
+      <a:srgbClr val="B13D24"/>
+    </a:accent2>
+    <a:accent3>
+      <a:srgbClr val="742B1C"/>
+    </a:accent3>
+    <a:accent4>
+      <a:srgbClr val="CDD9E7"/>
+    </a:accent4>
+    <a:accent5>
+      <a:srgbClr val="4C150C"/>
+    </a:accent5>
+    <a:accent6>
+      <a:srgbClr val="768394"/>
+    </a:accent6>
+    <a:hlink>
+      <a:srgbClr val="4276AA"/>
+    </a:hlink>
+    <a:folHlink>
+      <a:srgbClr val="BFBFBF"/>
+    </a:folHlink>
+  </a:clrScheme>
+</a:themeOverride>
 </file>
</xml_diff>